<commit_message>
Updated lesson #14 presentation
</commit_message>
<xml_diff>
--- a/Presentation/lesson-14.pptx
+++ b/Presentation/lesson-14.pptx
@@ -8,25 +8,25 @@
     <p:notesMasterId r:id="rId21"/>
   </p:notesMasterIdLst>
   <p:sldIdLst>
-    <p:sldId id="276" r:id="rId2"/>
-    <p:sldId id="258" r:id="rId3"/>
-    <p:sldId id="269" r:id="rId4"/>
-    <p:sldId id="259" r:id="rId5"/>
-    <p:sldId id="260" r:id="rId6"/>
-    <p:sldId id="261" r:id="rId7"/>
-    <p:sldId id="262" r:id="rId8"/>
-    <p:sldId id="263" r:id="rId9"/>
-    <p:sldId id="264" r:id="rId10"/>
-    <p:sldId id="265" r:id="rId11"/>
-    <p:sldId id="266" r:id="rId12"/>
-    <p:sldId id="267" r:id="rId13"/>
-    <p:sldId id="268" r:id="rId14"/>
-    <p:sldId id="271" r:id="rId15"/>
-    <p:sldId id="272" r:id="rId16"/>
-    <p:sldId id="270" r:id="rId17"/>
-    <p:sldId id="273" r:id="rId18"/>
-    <p:sldId id="274" r:id="rId19"/>
-    <p:sldId id="275" r:id="rId20"/>
+    <p:sldId id="258" r:id="rId2"/>
+    <p:sldId id="269" r:id="rId3"/>
+    <p:sldId id="259" r:id="rId4"/>
+    <p:sldId id="260" r:id="rId5"/>
+    <p:sldId id="261" r:id="rId6"/>
+    <p:sldId id="262" r:id="rId7"/>
+    <p:sldId id="263" r:id="rId8"/>
+    <p:sldId id="264" r:id="rId9"/>
+    <p:sldId id="265" r:id="rId10"/>
+    <p:sldId id="266" r:id="rId11"/>
+    <p:sldId id="267" r:id="rId12"/>
+    <p:sldId id="268" r:id="rId13"/>
+    <p:sldId id="271" r:id="rId14"/>
+    <p:sldId id="272" r:id="rId15"/>
+    <p:sldId id="270" r:id="rId16"/>
+    <p:sldId id="273" r:id="rId17"/>
+    <p:sldId id="274" r:id="rId18"/>
+    <p:sldId id="275" r:id="rId19"/>
+    <p:sldId id="276" r:id="rId20"/>
   </p:sldIdLst>
   <p:sldSz cx="9144000" cy="6858000" type="screen4x3"/>
   <p:notesSz cx="6858000" cy="9144000"/>
@@ -210,7 +210,7 @@
           <a:p>
             <a:fld id="{B24A7054-7FFB-49F4-A126-5DF6E687FF53}" type="datetimeFigureOut">
               <a:rPr lang="ru-RU" smtClean="0"/>
-              <a:t>10.09.2012</a:t>
+              <a:t>11.09.2012</a:t>
             </a:fld>
             <a:endParaRPr lang="ru-RU"/>
           </a:p>
@@ -1273,7 +1273,7 @@
           <a:p>
             <a:fld id="{8E6E6A2A-E9D3-4A0D-B04A-ABDD367A1E08}" type="datetimeFigureOut">
               <a:rPr lang="ru-RU" smtClean="0"/>
-              <a:t>10.09.2012</a:t>
+              <a:t>11.09.2012</a:t>
             </a:fld>
             <a:endParaRPr lang="ru-RU"/>
           </a:p>
@@ -2721,7 +2721,7 @@
           <a:p>
             <a:fld id="{AC3D3127-B7C4-45E3-9797-C527EC9FDD78}" type="datetimeFigureOut">
               <a:rPr lang="ru-RU" smtClean="0"/>
-              <a:t>10.09.2012</a:t>
+              <a:t>11.09.2012</a:t>
             </a:fld>
             <a:endParaRPr lang="ru-RU"/>
           </a:p>
@@ -3100,1174 +3100,6 @@
       </p:grpSpPr>
       <p:sp>
         <p:nvSpPr>
-          <p:cNvPr id="2" name="Title 1"/>
-          <p:cNvSpPr>
-            <a:spLocks noGrp="1"/>
-          </p:cNvSpPr>
-          <p:nvPr>
-            <p:ph type="title"/>
-          </p:nvPr>
-        </p:nvSpPr>
-        <p:spPr>
-          <a:xfrm>
-            <a:off x="457200" y="2857500"/>
-            <a:ext cx="8229600" cy="1143000"/>
-          </a:xfrm>
-        </p:spPr>
-        <p:txBody>
-          <a:bodyPr/>
-          <a:lstStyle/>
-          <a:p>
-            <a:r>
-              <a:rPr lang="ru-RU" dirty="0" smtClean="0"/>
-              <a:t>Задание + Вопросы</a:t>
-            </a:r>
-            <a:endParaRPr lang="en-US" dirty="0"/>
-          </a:p>
-        </p:txBody>
-      </p:sp>
-    </p:spTree>
-    <p:extLst>
-      <p:ext uri="{BB962C8B-B14F-4D97-AF65-F5344CB8AC3E}">
-        <p14:creationId xmlns:p14="http://schemas.microsoft.com/office/powerpoint/2010/main" val="819309963"/>
-      </p:ext>
-    </p:extLst>
-  </p:cSld>
-  <p:clrMapOvr>
-    <a:masterClrMapping/>
-  </p:clrMapOvr>
-</p:sld>
-</file>
-
-<file path=ppt/slides/slide10.xml><?xml version="1.0" encoding="utf-8"?>
-<p:sld xmlns:a="http://schemas.openxmlformats.org/drawingml/2006/main" xmlns:r="http://schemas.openxmlformats.org/officeDocument/2006/relationships" xmlns:p="http://schemas.openxmlformats.org/presentationml/2006/main">
-  <p:cSld>
-    <p:spTree>
-      <p:nvGrpSpPr>
-        <p:cNvPr id="1" name=""/>
-        <p:cNvGrpSpPr/>
-        <p:nvPr/>
-      </p:nvGrpSpPr>
-      <p:grpSpPr>
-        <a:xfrm>
-          <a:off x="0" y="0"/>
-          <a:ext cx="0" cy="0"/>
-          <a:chOff x="0" y="0"/>
-          <a:chExt cx="0" cy="0"/>
-        </a:xfrm>
-      </p:grpSpPr>
-      <p:sp>
-        <p:nvSpPr>
-          <p:cNvPr id="2" name="Title 1"/>
-          <p:cNvSpPr>
-            <a:spLocks noGrp="1"/>
-          </p:cNvSpPr>
-          <p:nvPr>
-            <p:ph type="title"/>
-          </p:nvPr>
-        </p:nvSpPr>
-        <p:spPr/>
-        <p:txBody>
-          <a:bodyPr>
-            <a:normAutofit fontScale="90000"/>
-          </a:bodyPr>
-          <a:lstStyle/>
-          <a:p>
-            <a:pPr marL="742950" indent="-742950">
-              <a:buFont typeface="+mj-lt"/>
-              <a:buAutoNum type="arabicPeriod" startAt="2"/>
-            </a:pPr>
-            <a:r>
-              <a:rPr lang="ru-RU" dirty="0" smtClean="0"/>
-              <a:t>Основополагающие принципы</a:t>
-            </a:r>
-            <a:endParaRPr lang="en-US" dirty="0"/>
-          </a:p>
-        </p:txBody>
-      </p:sp>
-      <p:sp>
-        <p:nvSpPr>
-          <p:cNvPr id="3" name="Content Placeholder 2"/>
-          <p:cNvSpPr>
-            <a:spLocks noGrp="1"/>
-          </p:cNvSpPr>
-          <p:nvPr>
-            <p:ph idx="1"/>
-          </p:nvPr>
-        </p:nvSpPr>
-        <p:spPr/>
-        <p:txBody>
-          <a:bodyPr>
-            <a:normAutofit/>
-          </a:bodyPr>
-          <a:lstStyle/>
-          <a:p>
-            <a:r>
-              <a:rPr lang="en-US" b="1" dirty="0" smtClean="0"/>
-              <a:t>Single </a:t>
-            </a:r>
-            <a:r>
-              <a:rPr lang="en-US" b="1" dirty="0"/>
-              <a:t>Responsibility principle</a:t>
-            </a:r>
-            <a:r>
-              <a:rPr lang="en-US" dirty="0"/>
-              <a:t>. Each component or module should be responsible for only a specific feature or functionality, or aggregation of cohesive functionality.</a:t>
-            </a:r>
-          </a:p>
-          <a:p>
-            <a:endParaRPr lang="en-US" dirty="0"/>
-          </a:p>
-        </p:txBody>
-      </p:sp>
-    </p:spTree>
-    <p:extLst>
-      <p:ext uri="{BB962C8B-B14F-4D97-AF65-F5344CB8AC3E}">
-        <p14:creationId xmlns:p14="http://schemas.microsoft.com/office/powerpoint/2010/main" val="546871388"/>
-      </p:ext>
-    </p:extLst>
-  </p:cSld>
-  <p:clrMapOvr>
-    <a:masterClrMapping/>
-  </p:clrMapOvr>
-</p:sld>
-</file>
-
-<file path=ppt/slides/slide11.xml><?xml version="1.0" encoding="utf-8"?>
-<p:sld xmlns:a="http://schemas.openxmlformats.org/drawingml/2006/main" xmlns:r="http://schemas.openxmlformats.org/officeDocument/2006/relationships" xmlns:p="http://schemas.openxmlformats.org/presentationml/2006/main">
-  <p:cSld>
-    <p:spTree>
-      <p:nvGrpSpPr>
-        <p:cNvPr id="1" name=""/>
-        <p:cNvGrpSpPr/>
-        <p:nvPr/>
-      </p:nvGrpSpPr>
-      <p:grpSpPr>
-        <a:xfrm>
-          <a:off x="0" y="0"/>
-          <a:ext cx="0" cy="0"/>
-          <a:chOff x="0" y="0"/>
-          <a:chExt cx="0" cy="0"/>
-        </a:xfrm>
-      </p:grpSpPr>
-      <p:sp>
-        <p:nvSpPr>
-          <p:cNvPr id="2" name="Title 1"/>
-          <p:cNvSpPr>
-            <a:spLocks noGrp="1"/>
-          </p:cNvSpPr>
-          <p:nvPr>
-            <p:ph type="title"/>
-          </p:nvPr>
-        </p:nvSpPr>
-        <p:spPr/>
-        <p:txBody>
-          <a:bodyPr>
-            <a:normAutofit fontScale="90000"/>
-          </a:bodyPr>
-          <a:lstStyle/>
-          <a:p>
-            <a:pPr marL="742950" indent="-742950">
-              <a:buFont typeface="+mj-lt"/>
-              <a:buAutoNum type="arabicPeriod" startAt="3"/>
-            </a:pPr>
-            <a:r>
-              <a:rPr lang="ru-RU" dirty="0" smtClean="0"/>
-              <a:t>Основополагающие принципы</a:t>
-            </a:r>
-            <a:endParaRPr lang="en-US" dirty="0"/>
-          </a:p>
-        </p:txBody>
-      </p:sp>
-      <p:sp>
-        <p:nvSpPr>
-          <p:cNvPr id="3" name="Content Placeholder 2"/>
-          <p:cNvSpPr>
-            <a:spLocks noGrp="1"/>
-          </p:cNvSpPr>
-          <p:nvPr>
-            <p:ph idx="1"/>
-          </p:nvPr>
-        </p:nvSpPr>
-        <p:spPr/>
-        <p:txBody>
-          <a:bodyPr>
-            <a:normAutofit/>
-          </a:bodyPr>
-          <a:lstStyle/>
-          <a:p>
-            <a:r>
-              <a:rPr lang="en-US" b="1" dirty="0" smtClean="0"/>
-              <a:t>Principle </a:t>
-            </a:r>
-            <a:r>
-              <a:rPr lang="en-US" b="1" dirty="0"/>
-              <a:t>of Least Knowledge </a:t>
-            </a:r>
-            <a:r>
-              <a:rPr lang="en-US" dirty="0"/>
-              <a:t>(also known as the Law of Demeter or </a:t>
-            </a:r>
-            <a:r>
-              <a:rPr lang="en-US" dirty="0" err="1"/>
-              <a:t>LoD</a:t>
-            </a:r>
-            <a:r>
-              <a:rPr lang="en-US" dirty="0"/>
-              <a:t>). A component or object should not know about internal details of other components or objects. </a:t>
-            </a:r>
-          </a:p>
-          <a:p>
-            <a:endParaRPr lang="en-US" dirty="0"/>
-          </a:p>
-        </p:txBody>
-      </p:sp>
-    </p:spTree>
-    <p:extLst>
-      <p:ext uri="{BB962C8B-B14F-4D97-AF65-F5344CB8AC3E}">
-        <p14:creationId xmlns:p14="http://schemas.microsoft.com/office/powerpoint/2010/main" val="1000591932"/>
-      </p:ext>
-    </p:extLst>
-  </p:cSld>
-  <p:clrMapOvr>
-    <a:masterClrMapping/>
-  </p:clrMapOvr>
-</p:sld>
-</file>
-
-<file path=ppt/slides/slide12.xml><?xml version="1.0" encoding="utf-8"?>
-<p:sld xmlns:a="http://schemas.openxmlformats.org/drawingml/2006/main" xmlns:r="http://schemas.openxmlformats.org/officeDocument/2006/relationships" xmlns:p="http://schemas.openxmlformats.org/presentationml/2006/main">
-  <p:cSld>
-    <p:spTree>
-      <p:nvGrpSpPr>
-        <p:cNvPr id="1" name=""/>
-        <p:cNvGrpSpPr/>
-        <p:nvPr/>
-      </p:nvGrpSpPr>
-      <p:grpSpPr>
-        <a:xfrm>
-          <a:off x="0" y="0"/>
-          <a:ext cx="0" cy="0"/>
-          <a:chOff x="0" y="0"/>
-          <a:chExt cx="0" cy="0"/>
-        </a:xfrm>
-      </p:grpSpPr>
-      <p:sp>
-        <p:nvSpPr>
-          <p:cNvPr id="2" name="Title 1"/>
-          <p:cNvSpPr>
-            <a:spLocks noGrp="1"/>
-          </p:cNvSpPr>
-          <p:nvPr>
-            <p:ph type="title"/>
-          </p:nvPr>
-        </p:nvSpPr>
-        <p:spPr/>
-        <p:txBody>
-          <a:bodyPr>
-            <a:normAutofit fontScale="90000"/>
-          </a:bodyPr>
-          <a:lstStyle/>
-          <a:p>
-            <a:pPr marL="742950" indent="-742950">
-              <a:buFont typeface="+mj-lt"/>
-              <a:buAutoNum type="arabicPeriod" startAt="4"/>
-            </a:pPr>
-            <a:r>
-              <a:rPr lang="ru-RU" dirty="0" smtClean="0"/>
-              <a:t>Основополагающие принципы</a:t>
-            </a:r>
-            <a:endParaRPr lang="en-US" dirty="0"/>
-          </a:p>
-        </p:txBody>
-      </p:sp>
-      <p:sp>
-        <p:nvSpPr>
-          <p:cNvPr id="3" name="Content Placeholder 2"/>
-          <p:cNvSpPr>
-            <a:spLocks noGrp="1"/>
-          </p:cNvSpPr>
-          <p:nvPr>
-            <p:ph idx="1"/>
-          </p:nvPr>
-        </p:nvSpPr>
-        <p:spPr/>
-        <p:txBody>
-          <a:bodyPr>
-            <a:normAutofit/>
-          </a:bodyPr>
-          <a:lstStyle/>
-          <a:p>
-            <a:r>
-              <a:rPr lang="en-US" b="1" dirty="0" smtClean="0"/>
-              <a:t>Don’t </a:t>
-            </a:r>
-            <a:r>
-              <a:rPr lang="en-US" b="1" dirty="0"/>
-              <a:t>repeat yourself (DRY)</a:t>
-            </a:r>
-            <a:r>
-              <a:rPr lang="en-US" dirty="0"/>
-              <a:t>. You should only need to specify intent in one place. For example, in terms of application design, specific functionality should be implemented in only one component; the functionality should not be duplicated in any other component. </a:t>
-            </a:r>
-          </a:p>
-          <a:p>
-            <a:endParaRPr lang="en-US" dirty="0"/>
-          </a:p>
-        </p:txBody>
-      </p:sp>
-    </p:spTree>
-    <p:extLst>
-      <p:ext uri="{BB962C8B-B14F-4D97-AF65-F5344CB8AC3E}">
-        <p14:creationId xmlns:p14="http://schemas.microsoft.com/office/powerpoint/2010/main" val="3119653803"/>
-      </p:ext>
-    </p:extLst>
-  </p:cSld>
-  <p:clrMapOvr>
-    <a:masterClrMapping/>
-  </p:clrMapOvr>
-</p:sld>
-</file>
-
-<file path=ppt/slides/slide13.xml><?xml version="1.0" encoding="utf-8"?>
-<p:sld xmlns:a="http://schemas.openxmlformats.org/drawingml/2006/main" xmlns:r="http://schemas.openxmlformats.org/officeDocument/2006/relationships" xmlns:p="http://schemas.openxmlformats.org/presentationml/2006/main">
-  <p:cSld>
-    <p:spTree>
-      <p:nvGrpSpPr>
-        <p:cNvPr id="1" name=""/>
-        <p:cNvGrpSpPr/>
-        <p:nvPr/>
-      </p:nvGrpSpPr>
-      <p:grpSpPr>
-        <a:xfrm>
-          <a:off x="0" y="0"/>
-          <a:ext cx="0" cy="0"/>
-          <a:chOff x="0" y="0"/>
-          <a:chExt cx="0" cy="0"/>
-        </a:xfrm>
-      </p:grpSpPr>
-      <p:sp>
-        <p:nvSpPr>
-          <p:cNvPr id="2" name="Title 1"/>
-          <p:cNvSpPr>
-            <a:spLocks noGrp="1"/>
-          </p:cNvSpPr>
-          <p:nvPr>
-            <p:ph type="title"/>
-          </p:nvPr>
-        </p:nvSpPr>
-        <p:spPr/>
-        <p:txBody>
-          <a:bodyPr>
-            <a:normAutofit fontScale="90000"/>
-          </a:bodyPr>
-          <a:lstStyle/>
-          <a:p>
-            <a:pPr marL="742950" indent="-742950">
-              <a:buFont typeface="+mj-lt"/>
-              <a:buAutoNum type="arabicPeriod" startAt="5"/>
-            </a:pPr>
-            <a:r>
-              <a:rPr lang="ru-RU" dirty="0" smtClean="0"/>
-              <a:t>Основополагающие принципы</a:t>
-            </a:r>
-            <a:endParaRPr lang="en-US" dirty="0"/>
-          </a:p>
-        </p:txBody>
-      </p:sp>
-      <p:sp>
-        <p:nvSpPr>
-          <p:cNvPr id="3" name="Content Placeholder 2"/>
-          <p:cNvSpPr>
-            <a:spLocks noGrp="1"/>
-          </p:cNvSpPr>
-          <p:nvPr>
-            <p:ph idx="1"/>
-          </p:nvPr>
-        </p:nvSpPr>
-        <p:spPr/>
-        <p:txBody>
-          <a:bodyPr>
-            <a:normAutofit fontScale="92500" lnSpcReduction="20000"/>
-          </a:bodyPr>
-          <a:lstStyle/>
-          <a:p>
-            <a:r>
-              <a:rPr lang="en-US" b="1" dirty="0" smtClean="0"/>
-              <a:t>Minimize </a:t>
-            </a:r>
-            <a:r>
-              <a:rPr lang="en-US" b="1" dirty="0"/>
-              <a:t>upfront design. </a:t>
-            </a:r>
-            <a:r>
-              <a:rPr lang="en-US" dirty="0"/>
-              <a:t>Only design what is necessary. In some cases, you may require upfront comprehensive design and testing if the cost of development or a failure in the design is very high. In other cases, especially for agile development, you can avoid big design upfront (BDUF). If your application requirements are unclear, or if there is a possibility of the design evolving over time, avoid making a large design effort prematurely. This principle is sometimes known as YAGNI ("You </a:t>
-            </a:r>
-            <a:r>
-              <a:rPr lang="en-US" dirty="0" err="1"/>
-              <a:t>ain’t</a:t>
-            </a:r>
-            <a:r>
-              <a:rPr lang="en-US" dirty="0"/>
-              <a:t> </a:t>
-            </a:r>
-            <a:r>
-              <a:rPr lang="en-US" dirty="0" err="1"/>
-              <a:t>gonna</a:t>
-            </a:r>
-            <a:r>
-              <a:rPr lang="en-US" dirty="0"/>
-              <a:t> need it").</a:t>
-            </a:r>
-          </a:p>
-          <a:p>
-            <a:endParaRPr lang="en-US" dirty="0"/>
-          </a:p>
-        </p:txBody>
-      </p:sp>
-    </p:spTree>
-    <p:extLst>
-      <p:ext uri="{BB962C8B-B14F-4D97-AF65-F5344CB8AC3E}">
-        <p14:creationId xmlns:p14="http://schemas.microsoft.com/office/powerpoint/2010/main" val="1171042694"/>
-      </p:ext>
-    </p:extLst>
-  </p:cSld>
-  <p:clrMapOvr>
-    <a:masterClrMapping/>
-  </p:clrMapOvr>
-</p:sld>
-</file>
-
-<file path=ppt/slides/slide14.xml><?xml version="1.0" encoding="utf-8"?>
-<p:sld xmlns:a="http://schemas.openxmlformats.org/drawingml/2006/main" xmlns:r="http://schemas.openxmlformats.org/officeDocument/2006/relationships" xmlns:p="http://schemas.openxmlformats.org/presentationml/2006/main">
-  <p:cSld>
-    <p:spTree>
-      <p:nvGrpSpPr>
-        <p:cNvPr id="1" name=""/>
-        <p:cNvGrpSpPr/>
-        <p:nvPr/>
-      </p:nvGrpSpPr>
-      <p:grpSpPr>
-        <a:xfrm>
-          <a:off x="0" y="0"/>
-          <a:ext cx="0" cy="0"/>
-          <a:chOff x="0" y="0"/>
-          <a:chExt cx="0" cy="0"/>
-        </a:xfrm>
-      </p:grpSpPr>
-      <p:sp>
-        <p:nvSpPr>
-          <p:cNvPr id="2" name="Title 1"/>
-          <p:cNvSpPr>
-            <a:spLocks noGrp="1"/>
-          </p:cNvSpPr>
-          <p:nvPr>
-            <p:ph type="title"/>
-          </p:nvPr>
-        </p:nvSpPr>
-        <p:spPr/>
-        <p:txBody>
-          <a:bodyPr/>
-          <a:lstStyle/>
-          <a:p>
-            <a:r>
-              <a:rPr lang="ru-RU" dirty="0" smtClean="0"/>
-              <a:t>Жизненный цикл ПО</a:t>
-            </a:r>
-            <a:endParaRPr lang="en-US" dirty="0"/>
-          </a:p>
-        </p:txBody>
-      </p:sp>
-      <p:sp>
-        <p:nvSpPr>
-          <p:cNvPr id="3" name="Content Placeholder 2"/>
-          <p:cNvSpPr>
-            <a:spLocks noGrp="1"/>
-          </p:cNvSpPr>
-          <p:nvPr>
-            <p:ph idx="1"/>
-          </p:nvPr>
-        </p:nvSpPr>
-        <p:spPr/>
-        <p:txBody>
-          <a:bodyPr>
-            <a:normAutofit fontScale="92500" lnSpcReduction="20000"/>
-          </a:bodyPr>
-          <a:lstStyle/>
-          <a:p>
-            <a:r>
-              <a:rPr lang="ru-RU" dirty="0" smtClean="0"/>
-              <a:t>Требования (</a:t>
-            </a:r>
-            <a:r>
-              <a:rPr lang="en-US" dirty="0" smtClean="0"/>
-              <a:t>Requirements</a:t>
-            </a:r>
-            <a:r>
-              <a:rPr lang="ru-RU" dirty="0" smtClean="0"/>
-              <a:t>)</a:t>
-            </a:r>
-            <a:endParaRPr lang="en-US" dirty="0"/>
-          </a:p>
-          <a:p>
-            <a:r>
-              <a:rPr lang="ru-RU" dirty="0" smtClean="0"/>
-              <a:t>Спецификация (</a:t>
-            </a:r>
-            <a:r>
-              <a:rPr lang="en-US" dirty="0" smtClean="0"/>
-              <a:t>Specification</a:t>
-            </a:r>
-            <a:r>
-              <a:rPr lang="ru-RU" dirty="0" smtClean="0"/>
-              <a:t>)</a:t>
-            </a:r>
-            <a:endParaRPr lang="en-US" dirty="0"/>
-          </a:p>
-          <a:p>
-            <a:r>
-              <a:rPr lang="ru-RU" dirty="0" smtClean="0"/>
-              <a:t>Архитектура (</a:t>
-            </a:r>
-            <a:r>
-              <a:rPr lang="en-US" dirty="0" smtClean="0"/>
-              <a:t>Architecture</a:t>
-            </a:r>
-            <a:r>
-              <a:rPr lang="ru-RU" dirty="0" smtClean="0"/>
-              <a:t>)</a:t>
-            </a:r>
-            <a:endParaRPr lang="en-US" dirty="0"/>
-          </a:p>
-          <a:p>
-            <a:r>
-              <a:rPr lang="ru-RU" dirty="0" smtClean="0"/>
-              <a:t>Дизайн (</a:t>
-            </a:r>
-            <a:r>
-              <a:rPr lang="en-US" dirty="0" smtClean="0"/>
-              <a:t>Design</a:t>
-            </a:r>
-            <a:r>
-              <a:rPr lang="ru-RU" dirty="0" smtClean="0"/>
-              <a:t>)</a:t>
-            </a:r>
-            <a:endParaRPr lang="en-US" dirty="0"/>
-          </a:p>
-          <a:p>
-            <a:r>
-              <a:rPr lang="ru-RU" dirty="0" smtClean="0"/>
-              <a:t>Программирование (</a:t>
-            </a:r>
-            <a:r>
-              <a:rPr lang="en-US" dirty="0" smtClean="0"/>
-              <a:t>Implementation</a:t>
-            </a:r>
-            <a:r>
-              <a:rPr lang="ru-RU" dirty="0" smtClean="0"/>
-              <a:t>)</a:t>
-            </a:r>
-            <a:endParaRPr lang="en-US" dirty="0"/>
-          </a:p>
-          <a:p>
-            <a:r>
-              <a:rPr lang="ru-RU" dirty="0" smtClean="0"/>
-              <a:t>Тестирование (</a:t>
-            </a:r>
-            <a:r>
-              <a:rPr lang="en-US" dirty="0" smtClean="0"/>
-              <a:t>Testing</a:t>
-            </a:r>
-            <a:r>
-              <a:rPr lang="ru-RU" dirty="0" smtClean="0"/>
-              <a:t>)</a:t>
-            </a:r>
-            <a:endParaRPr lang="en-US" dirty="0"/>
-          </a:p>
-          <a:p>
-            <a:r>
-              <a:rPr lang="ru-RU" dirty="0" smtClean="0"/>
-              <a:t>Отладка (</a:t>
-            </a:r>
-            <a:r>
-              <a:rPr lang="en-US" dirty="0" smtClean="0"/>
-              <a:t>Debugging</a:t>
-            </a:r>
-            <a:r>
-              <a:rPr lang="ru-RU" dirty="0" smtClean="0"/>
-              <a:t>)</a:t>
-            </a:r>
-            <a:endParaRPr lang="en-US" dirty="0"/>
-          </a:p>
-          <a:p>
-            <a:r>
-              <a:rPr lang="ru-RU" dirty="0" smtClean="0"/>
-              <a:t>Дистрибутив (</a:t>
-            </a:r>
-            <a:r>
-              <a:rPr lang="en-US" dirty="0" smtClean="0"/>
-              <a:t>Deployment</a:t>
-            </a:r>
-            <a:r>
-              <a:rPr lang="ru-RU" dirty="0" smtClean="0"/>
-              <a:t>)</a:t>
-            </a:r>
-            <a:endParaRPr lang="en-US" dirty="0" smtClean="0"/>
-          </a:p>
-          <a:p>
-            <a:r>
-              <a:rPr lang="ru-RU" dirty="0" smtClean="0"/>
-              <a:t>Сопровождение (</a:t>
-            </a:r>
-            <a:r>
-              <a:rPr lang="en-US" dirty="0" smtClean="0"/>
-              <a:t>Maintenance</a:t>
-            </a:r>
-            <a:r>
-              <a:rPr lang="ru-RU" dirty="0" smtClean="0"/>
-              <a:t>)</a:t>
-            </a:r>
-            <a:endParaRPr lang="en-US" dirty="0"/>
-          </a:p>
-        </p:txBody>
-      </p:sp>
-    </p:spTree>
-    <p:extLst>
-      <p:ext uri="{BB962C8B-B14F-4D97-AF65-F5344CB8AC3E}">
-        <p14:creationId xmlns:p14="http://schemas.microsoft.com/office/powerpoint/2010/main" val="3256343997"/>
-      </p:ext>
-    </p:extLst>
-  </p:cSld>
-  <p:clrMapOvr>
-    <a:masterClrMapping/>
-  </p:clrMapOvr>
-</p:sld>
-</file>
-
-<file path=ppt/slides/slide15.xml><?xml version="1.0" encoding="utf-8"?>
-<p:sld xmlns:a="http://schemas.openxmlformats.org/drawingml/2006/main" xmlns:r="http://schemas.openxmlformats.org/officeDocument/2006/relationships" xmlns:p="http://schemas.openxmlformats.org/presentationml/2006/main">
-  <p:cSld>
-    <p:spTree>
-      <p:nvGrpSpPr>
-        <p:cNvPr id="1" name=""/>
-        <p:cNvGrpSpPr/>
-        <p:nvPr/>
-      </p:nvGrpSpPr>
-      <p:grpSpPr>
-        <a:xfrm>
-          <a:off x="0" y="0"/>
-          <a:ext cx="0" cy="0"/>
-          <a:chOff x="0" y="0"/>
-          <a:chExt cx="0" cy="0"/>
-        </a:xfrm>
-      </p:grpSpPr>
-      <p:sp>
-        <p:nvSpPr>
-          <p:cNvPr id="2" name="Title 1"/>
-          <p:cNvSpPr>
-            <a:spLocks noGrp="1"/>
-          </p:cNvSpPr>
-          <p:nvPr>
-            <p:ph type="title"/>
-          </p:nvPr>
-        </p:nvSpPr>
-        <p:spPr/>
-        <p:txBody>
-          <a:bodyPr>
-            <a:normAutofit fontScale="90000"/>
-          </a:bodyPr>
-          <a:lstStyle/>
-          <a:p>
-            <a:r>
-              <a:rPr lang="ru-RU" dirty="0"/>
-              <a:t>Цикл разработки программного обеспечения</a:t>
-            </a:r>
-            <a:endParaRPr lang="en-US" dirty="0"/>
-          </a:p>
-        </p:txBody>
-      </p:sp>
-      <p:sp>
-        <p:nvSpPr>
-          <p:cNvPr id="3" name="Content Placeholder 2"/>
-          <p:cNvSpPr>
-            <a:spLocks noGrp="1"/>
-          </p:cNvSpPr>
-          <p:nvPr>
-            <p:ph idx="1"/>
-          </p:nvPr>
-        </p:nvSpPr>
-        <p:spPr/>
-        <p:txBody>
-          <a:bodyPr/>
-          <a:lstStyle/>
-          <a:p>
-            <a:r>
-              <a:rPr lang="ru-RU" dirty="0" smtClean="0"/>
-              <a:t>Водопад</a:t>
-            </a:r>
-          </a:p>
-          <a:p>
-            <a:r>
-              <a:rPr lang="ru-RU" dirty="0" smtClean="0"/>
-              <a:t>Спираль</a:t>
-            </a:r>
-          </a:p>
-          <a:p>
-            <a:r>
-              <a:rPr lang="ru-RU" dirty="0" smtClean="0"/>
-              <a:t>Гибкая модель</a:t>
-            </a:r>
-            <a:endParaRPr lang="en-US" dirty="0"/>
-          </a:p>
-        </p:txBody>
-      </p:sp>
-    </p:spTree>
-    <p:extLst>
-      <p:ext uri="{BB962C8B-B14F-4D97-AF65-F5344CB8AC3E}">
-        <p14:creationId xmlns:p14="http://schemas.microsoft.com/office/powerpoint/2010/main" val="3295934606"/>
-      </p:ext>
-    </p:extLst>
-  </p:cSld>
-  <p:clrMapOvr>
-    <a:masterClrMapping/>
-  </p:clrMapOvr>
-</p:sld>
-</file>
-
-<file path=ppt/slides/slide16.xml><?xml version="1.0" encoding="utf-8"?>
-<p:sld xmlns:a="http://schemas.openxmlformats.org/drawingml/2006/main" xmlns:r="http://schemas.openxmlformats.org/officeDocument/2006/relationships" xmlns:p="http://schemas.openxmlformats.org/presentationml/2006/main">
-  <p:cSld>
-    <p:spTree>
-      <p:nvGrpSpPr>
-        <p:cNvPr id="1" name=""/>
-        <p:cNvGrpSpPr/>
-        <p:nvPr/>
-      </p:nvGrpSpPr>
-      <p:grpSpPr>
-        <a:xfrm>
-          <a:off x="0" y="0"/>
-          <a:ext cx="0" cy="0"/>
-          <a:chOff x="0" y="0"/>
-          <a:chExt cx="0" cy="0"/>
-        </a:xfrm>
-      </p:grpSpPr>
-      <p:sp>
-        <p:nvSpPr>
-          <p:cNvPr id="2" name="Title 1"/>
-          <p:cNvSpPr>
-            <a:spLocks noGrp="1"/>
-          </p:cNvSpPr>
-          <p:nvPr>
-            <p:ph type="title"/>
-          </p:nvPr>
-        </p:nvSpPr>
-        <p:spPr/>
-        <p:txBody>
-          <a:bodyPr/>
-          <a:lstStyle/>
-          <a:p>
-            <a:r>
-              <a:rPr lang="ru-RU" dirty="0" smtClean="0"/>
-              <a:t>«Водопад» (</a:t>
-            </a:r>
-            <a:r>
-              <a:rPr lang="en-US" dirty="0" smtClean="0"/>
-              <a:t>Waterfall</a:t>
-            </a:r>
-            <a:r>
-              <a:rPr lang="ru-RU" dirty="0" smtClean="0"/>
-              <a:t>)</a:t>
-            </a:r>
-            <a:endParaRPr lang="en-US" dirty="0"/>
-          </a:p>
-        </p:txBody>
-      </p:sp>
-      <p:pic>
-        <p:nvPicPr>
-          <p:cNvPr id="4098" name="Picture 2" descr="http://upload.wikimedia.org/wikipedia/commons/thumb/0/06/Waterfall_model_%281%29.svg/500px-Waterfall_model_%281%29.svg.png"/>
-          <p:cNvPicPr>
-            <a:picLocks noChangeAspect="1" noChangeArrowheads="1"/>
-          </p:cNvPicPr>
-          <p:nvPr/>
-        </p:nvPicPr>
-        <p:blipFill>
-          <a:blip r:embed="rId2">
-            <a:extLst>
-              <a:ext uri="{28A0092B-C50C-407E-A947-70E740481C1C}">
-                <a14:useLocalDpi xmlns:a14="http://schemas.microsoft.com/office/drawing/2010/main" val="0"/>
-              </a:ext>
-            </a:extLst>
-          </a:blip>
-          <a:srcRect/>
-          <a:stretch>
-            <a:fillRect/>
-          </a:stretch>
-        </p:blipFill>
-        <p:spPr bwMode="auto">
-          <a:xfrm>
-            <a:off x="2190750" y="1772816"/>
-            <a:ext cx="4762500" cy="3571875"/>
-          </a:xfrm>
-          <a:prstGeom prst="rect">
-            <a:avLst/>
-          </a:prstGeom>
-          <a:noFill/>
-          <a:extLst>
-            <a:ext uri="{909E8E84-426E-40DD-AFC4-6F175D3DCCD1}">
-              <a14:hiddenFill xmlns:a14="http://schemas.microsoft.com/office/drawing/2010/main">
-                <a:solidFill>
-                  <a:srgbClr val="FFFFFF"/>
-                </a:solidFill>
-              </a14:hiddenFill>
-            </a:ext>
-          </a:extLst>
-        </p:spPr>
-      </p:pic>
-    </p:spTree>
-    <p:extLst>
-      <p:ext uri="{BB962C8B-B14F-4D97-AF65-F5344CB8AC3E}">
-        <p14:creationId xmlns:p14="http://schemas.microsoft.com/office/powerpoint/2010/main" val="4057089775"/>
-      </p:ext>
-    </p:extLst>
-  </p:cSld>
-  <p:clrMapOvr>
-    <a:masterClrMapping/>
-  </p:clrMapOvr>
-</p:sld>
-</file>
-
-<file path=ppt/slides/slide17.xml><?xml version="1.0" encoding="utf-8"?>
-<p:sld xmlns:a="http://schemas.openxmlformats.org/drawingml/2006/main" xmlns:r="http://schemas.openxmlformats.org/officeDocument/2006/relationships" xmlns:p="http://schemas.openxmlformats.org/presentationml/2006/main">
-  <p:cSld>
-    <p:bg>
-      <p:bgPr>
-        <a:solidFill>
-          <a:schemeClr val="accent1"/>
-        </a:solidFill>
-        <a:effectLst/>
-      </p:bgPr>
-    </p:bg>
-    <p:spTree>
-      <p:nvGrpSpPr>
-        <p:cNvPr id="1" name=""/>
-        <p:cNvGrpSpPr/>
-        <p:nvPr/>
-      </p:nvGrpSpPr>
-      <p:grpSpPr>
-        <a:xfrm>
-          <a:off x="0" y="0"/>
-          <a:ext cx="0" cy="0"/>
-          <a:chOff x="0" y="0"/>
-          <a:chExt cx="0" cy="0"/>
-        </a:xfrm>
-      </p:grpSpPr>
-      <p:sp>
-        <p:nvSpPr>
-          <p:cNvPr id="2" name="Title 1"/>
-          <p:cNvSpPr>
-            <a:spLocks noGrp="1"/>
-          </p:cNvSpPr>
-          <p:nvPr>
-            <p:ph type="title"/>
-          </p:nvPr>
-        </p:nvSpPr>
-        <p:spPr/>
-        <p:txBody>
-          <a:bodyPr/>
-          <a:lstStyle/>
-          <a:p>
-            <a:r>
-              <a:rPr lang="ru-RU" dirty="0" smtClean="0">
-                <a:solidFill>
-                  <a:srgbClr val="000000"/>
-                </a:solidFill>
-              </a:rPr>
-              <a:t>Спираль</a:t>
-            </a:r>
-            <a:endParaRPr lang="en-US" dirty="0">
-              <a:solidFill>
-                <a:srgbClr val="000000"/>
-              </a:solidFill>
-            </a:endParaRPr>
-          </a:p>
-        </p:txBody>
-      </p:sp>
-      <p:pic>
-        <p:nvPicPr>
-          <p:cNvPr id="5122" name="Picture 2" descr="http://upload.wikimedia.org/wikipedia/commons/thumb/e/ec/Spiral_model_%28Boehm%2C_1988%29.svg/500px-Spiral_model_%28Boehm%2C_1988%29.svg.png"/>
-          <p:cNvPicPr>
-            <a:picLocks noChangeAspect="1" noChangeArrowheads="1"/>
-          </p:cNvPicPr>
-          <p:nvPr/>
-        </p:nvPicPr>
-        <p:blipFill>
-          <a:blip r:embed="rId2">
-            <a:extLst>
-              <a:ext uri="{28A0092B-C50C-407E-A947-70E740481C1C}">
-                <a14:useLocalDpi xmlns:a14="http://schemas.microsoft.com/office/drawing/2010/main" val="0"/>
-              </a:ext>
-            </a:extLst>
-          </a:blip>
-          <a:srcRect/>
-          <a:stretch>
-            <a:fillRect/>
-          </a:stretch>
-        </p:blipFill>
-        <p:spPr bwMode="auto">
-          <a:xfrm>
-            <a:off x="2190750" y="1443038"/>
-            <a:ext cx="4762500" cy="3971925"/>
-          </a:xfrm>
-          <a:prstGeom prst="rect">
-            <a:avLst/>
-          </a:prstGeom>
-          <a:noFill/>
-          <a:extLst>
-            <a:ext uri="{909E8E84-426E-40DD-AFC4-6F175D3DCCD1}">
-              <a14:hiddenFill xmlns:a14="http://schemas.microsoft.com/office/drawing/2010/main">
-                <a:solidFill>
-                  <a:srgbClr val="FFFFFF"/>
-                </a:solidFill>
-              </a14:hiddenFill>
-            </a:ext>
-          </a:extLst>
-        </p:spPr>
-      </p:pic>
-    </p:spTree>
-    <p:extLst>
-      <p:ext uri="{BB962C8B-B14F-4D97-AF65-F5344CB8AC3E}">
-        <p14:creationId xmlns:p14="http://schemas.microsoft.com/office/powerpoint/2010/main" val="658520332"/>
-      </p:ext>
-    </p:extLst>
-  </p:cSld>
-  <p:clrMapOvr>
-    <a:masterClrMapping/>
-  </p:clrMapOvr>
-</p:sld>
-</file>
-
-<file path=ppt/slides/slide18.xml><?xml version="1.0" encoding="utf-8"?>
-<p:sld xmlns:a="http://schemas.openxmlformats.org/drawingml/2006/main" xmlns:r="http://schemas.openxmlformats.org/officeDocument/2006/relationships" xmlns:p="http://schemas.openxmlformats.org/presentationml/2006/main">
-  <p:cSld>
-    <p:bg>
-      <p:bgPr>
-        <a:solidFill>
-          <a:schemeClr val="accent1"/>
-        </a:solidFill>
-        <a:effectLst/>
-      </p:bgPr>
-    </p:bg>
-    <p:spTree>
-      <p:nvGrpSpPr>
-        <p:cNvPr id="1" name=""/>
-        <p:cNvGrpSpPr/>
-        <p:nvPr/>
-      </p:nvGrpSpPr>
-      <p:grpSpPr>
-        <a:xfrm>
-          <a:off x="0" y="0"/>
-          <a:ext cx="0" cy="0"/>
-          <a:chOff x="0" y="0"/>
-          <a:chExt cx="0" cy="0"/>
-        </a:xfrm>
-      </p:grpSpPr>
-      <p:sp>
-        <p:nvSpPr>
-          <p:cNvPr id="2" name="Title 1"/>
-          <p:cNvSpPr>
-            <a:spLocks noGrp="1"/>
-          </p:cNvSpPr>
-          <p:nvPr>
-            <p:ph type="title"/>
-          </p:nvPr>
-        </p:nvSpPr>
-        <p:spPr/>
-        <p:txBody>
-          <a:bodyPr/>
-          <a:lstStyle/>
-          <a:p>
-            <a:r>
-              <a:rPr lang="ru-RU" dirty="0" smtClean="0">
-                <a:solidFill>
-                  <a:srgbClr val="000000"/>
-                </a:solidFill>
-              </a:rPr>
-              <a:t>Гибкая модель </a:t>
-            </a:r>
-            <a:r>
-              <a:rPr lang="en-US" dirty="0" smtClean="0">
-                <a:solidFill>
-                  <a:srgbClr val="000000"/>
-                </a:solidFill>
-              </a:rPr>
-              <a:t>(Agile)</a:t>
-            </a:r>
-            <a:endParaRPr lang="en-US" dirty="0">
-              <a:solidFill>
-                <a:srgbClr val="000000"/>
-              </a:solidFill>
-            </a:endParaRPr>
-          </a:p>
-        </p:txBody>
-      </p:sp>
-      <p:pic>
-        <p:nvPicPr>
-          <p:cNvPr id="6146" name="Picture 2" descr="http://upload.wikimedia.org/wikipedia/commons/thumb/8/89/Agile_Software_Development_methodology.svg/486px-Agile_Software_Development_methodology.svg.png"/>
-          <p:cNvPicPr>
-            <a:picLocks noChangeAspect="1" noChangeArrowheads="1"/>
-          </p:cNvPicPr>
-          <p:nvPr/>
-        </p:nvPicPr>
-        <p:blipFill rotWithShape="1">
-          <a:blip r:embed="rId2">
-            <a:extLst>
-              <a:ext uri="{28A0092B-C50C-407E-A947-70E740481C1C}">
-                <a14:useLocalDpi xmlns:a14="http://schemas.microsoft.com/office/drawing/2010/main" val="0"/>
-              </a:ext>
-            </a:extLst>
-          </a:blip>
-          <a:srcRect l="-199" t="11706" r="199" b="8892"/>
-          <a:stretch/>
-        </p:blipFill>
-        <p:spPr bwMode="auto">
-          <a:xfrm>
-            <a:off x="2257425" y="1483471"/>
-            <a:ext cx="4629150" cy="4537817"/>
-          </a:xfrm>
-          <a:prstGeom prst="rect">
-            <a:avLst/>
-          </a:prstGeom>
-          <a:noFill/>
-          <a:extLst>
-            <a:ext uri="{909E8E84-426E-40DD-AFC4-6F175D3DCCD1}">
-              <a14:hiddenFill xmlns:a14="http://schemas.microsoft.com/office/drawing/2010/main">
-                <a:solidFill>
-                  <a:srgbClr val="FFFFFF"/>
-                </a:solidFill>
-              </a14:hiddenFill>
-            </a:ext>
-          </a:extLst>
-        </p:spPr>
-      </p:pic>
-    </p:spTree>
-    <p:extLst>
-      <p:ext uri="{BB962C8B-B14F-4D97-AF65-F5344CB8AC3E}">
-        <p14:creationId xmlns:p14="http://schemas.microsoft.com/office/powerpoint/2010/main" val="2094657234"/>
-      </p:ext>
-    </p:extLst>
-  </p:cSld>
-  <p:clrMapOvr>
-    <a:masterClrMapping/>
-  </p:clrMapOvr>
-</p:sld>
-</file>
-
-<file path=ppt/slides/slide19.xml><?xml version="1.0" encoding="utf-8"?>
-<p:sld xmlns:a="http://schemas.openxmlformats.org/drawingml/2006/main" xmlns:r="http://schemas.openxmlformats.org/officeDocument/2006/relationships" xmlns:p="http://schemas.openxmlformats.org/presentationml/2006/main">
-  <p:cSld>
-    <p:spTree>
-      <p:nvGrpSpPr>
-        <p:cNvPr id="1" name=""/>
-        <p:cNvGrpSpPr/>
-        <p:nvPr/>
-      </p:nvGrpSpPr>
-      <p:grpSpPr>
-        <a:xfrm>
-          <a:off x="0" y="0"/>
-          <a:ext cx="0" cy="0"/>
-          <a:chOff x="0" y="0"/>
-          <a:chExt cx="0" cy="0"/>
-        </a:xfrm>
-      </p:grpSpPr>
-      <p:sp>
-        <p:nvSpPr>
-          <p:cNvPr id="2" name="Title 1"/>
-          <p:cNvSpPr>
-            <a:spLocks noGrp="1"/>
-          </p:cNvSpPr>
-          <p:nvPr>
-            <p:ph type="title"/>
-          </p:nvPr>
-        </p:nvSpPr>
-        <p:spPr/>
-        <p:txBody>
-          <a:bodyPr/>
-          <a:lstStyle/>
-          <a:p>
-            <a:r>
-              <a:rPr lang="ru-RU" dirty="0" smtClean="0"/>
-              <a:t>Процесс разработки ПО</a:t>
-            </a:r>
-            <a:endParaRPr lang="en-US" dirty="0"/>
-          </a:p>
-        </p:txBody>
-      </p:sp>
-      <p:sp>
-        <p:nvSpPr>
-          <p:cNvPr id="3" name="Content Placeholder 2"/>
-          <p:cNvSpPr>
-            <a:spLocks noGrp="1"/>
-          </p:cNvSpPr>
-          <p:nvPr>
-            <p:ph idx="1"/>
-          </p:nvPr>
-        </p:nvSpPr>
-        <p:spPr/>
-        <p:txBody>
-          <a:bodyPr/>
-          <a:lstStyle/>
-          <a:p>
-            <a:r>
-              <a:rPr lang="en-US" dirty="0" smtClean="0"/>
-              <a:t>Test Driven Development (</a:t>
-            </a:r>
-            <a:r>
-              <a:rPr lang="ru-RU" dirty="0" smtClean="0"/>
-              <a:t>управляемое тестами)</a:t>
-            </a:r>
-          </a:p>
-          <a:p>
-            <a:r>
-              <a:rPr lang="en-US" dirty="0" smtClean="0"/>
-              <a:t>Continuous Integration (CI)</a:t>
-            </a:r>
-            <a:endParaRPr lang="en-US" dirty="0"/>
-          </a:p>
-        </p:txBody>
-      </p:sp>
-    </p:spTree>
-    <p:extLst>
-      <p:ext uri="{BB962C8B-B14F-4D97-AF65-F5344CB8AC3E}">
-        <p14:creationId xmlns:p14="http://schemas.microsoft.com/office/powerpoint/2010/main" val="3800880669"/>
-      </p:ext>
-    </p:extLst>
-  </p:cSld>
-  <p:clrMapOvr>
-    <a:masterClrMapping/>
-  </p:clrMapOvr>
-</p:sld>
-</file>
-
-<file path=ppt/slides/slide2.xml><?xml version="1.0" encoding="utf-8"?>
-<p:sld xmlns:a="http://schemas.openxmlformats.org/drawingml/2006/main" xmlns:r="http://schemas.openxmlformats.org/officeDocument/2006/relationships" xmlns:p="http://schemas.openxmlformats.org/presentationml/2006/main">
-  <p:cSld>
-    <p:spTree>
-      <p:nvGrpSpPr>
-        <p:cNvPr id="1" name=""/>
-        <p:cNvGrpSpPr/>
-        <p:nvPr/>
-      </p:nvGrpSpPr>
-      <p:grpSpPr>
-        <a:xfrm>
-          <a:off x="0" y="0"/>
-          <a:ext cx="0" cy="0"/>
-          <a:chOff x="0" y="0"/>
-          <a:chExt cx="0" cy="0"/>
-        </a:xfrm>
-      </p:grpSpPr>
-      <p:sp>
-        <p:nvSpPr>
           <p:cNvPr id="5" name="Rectangle 4"/>
           <p:cNvSpPr/>
           <p:nvPr/>
@@ -4451,6 +3283,1329 @@
 </p:sld>
 </file>
 
+<file path=ppt/slides/slide10.xml><?xml version="1.0" encoding="utf-8"?>
+<p:sld xmlns:a="http://schemas.openxmlformats.org/drawingml/2006/main" xmlns:r="http://schemas.openxmlformats.org/officeDocument/2006/relationships" xmlns:p="http://schemas.openxmlformats.org/presentationml/2006/main">
+  <p:cSld>
+    <p:spTree>
+      <p:nvGrpSpPr>
+        <p:cNvPr id="1" name=""/>
+        <p:cNvGrpSpPr/>
+        <p:nvPr/>
+      </p:nvGrpSpPr>
+      <p:grpSpPr>
+        <a:xfrm>
+          <a:off x="0" y="0"/>
+          <a:ext cx="0" cy="0"/>
+          <a:chOff x="0" y="0"/>
+          <a:chExt cx="0" cy="0"/>
+        </a:xfrm>
+      </p:grpSpPr>
+      <p:sp>
+        <p:nvSpPr>
+          <p:cNvPr id="2" name="Title 1"/>
+          <p:cNvSpPr>
+            <a:spLocks noGrp="1"/>
+          </p:cNvSpPr>
+          <p:nvPr>
+            <p:ph type="title"/>
+          </p:nvPr>
+        </p:nvSpPr>
+        <p:spPr/>
+        <p:txBody>
+          <a:bodyPr>
+            <a:normAutofit fontScale="90000"/>
+          </a:bodyPr>
+          <a:lstStyle/>
+          <a:p>
+            <a:pPr marL="742950" indent="-742950">
+              <a:buFont typeface="+mj-lt"/>
+              <a:buAutoNum type="arabicPeriod" startAt="3"/>
+            </a:pPr>
+            <a:r>
+              <a:rPr lang="ru-RU" dirty="0" smtClean="0"/>
+              <a:t>Основополагающие принципы</a:t>
+            </a:r>
+            <a:endParaRPr lang="en-US" dirty="0"/>
+          </a:p>
+        </p:txBody>
+      </p:sp>
+      <p:sp>
+        <p:nvSpPr>
+          <p:cNvPr id="3" name="Content Placeholder 2"/>
+          <p:cNvSpPr>
+            <a:spLocks noGrp="1"/>
+          </p:cNvSpPr>
+          <p:nvPr>
+            <p:ph idx="1"/>
+          </p:nvPr>
+        </p:nvSpPr>
+        <p:spPr/>
+        <p:txBody>
+          <a:bodyPr>
+            <a:normAutofit/>
+          </a:bodyPr>
+          <a:lstStyle/>
+          <a:p>
+            <a:r>
+              <a:rPr lang="en-US" b="1" dirty="0" smtClean="0"/>
+              <a:t>Principle </a:t>
+            </a:r>
+            <a:r>
+              <a:rPr lang="en-US" b="1" dirty="0"/>
+              <a:t>of Least Knowledge </a:t>
+            </a:r>
+            <a:r>
+              <a:rPr lang="en-US" dirty="0"/>
+              <a:t>(also known as the Law of Demeter or </a:t>
+            </a:r>
+            <a:r>
+              <a:rPr lang="en-US" dirty="0" err="1"/>
+              <a:t>LoD</a:t>
+            </a:r>
+            <a:r>
+              <a:rPr lang="en-US" dirty="0"/>
+              <a:t>). A component or object should not know about internal details of other components or objects. </a:t>
+            </a:r>
+          </a:p>
+          <a:p>
+            <a:endParaRPr lang="en-US" dirty="0"/>
+          </a:p>
+        </p:txBody>
+      </p:sp>
+    </p:spTree>
+    <p:extLst>
+      <p:ext uri="{BB962C8B-B14F-4D97-AF65-F5344CB8AC3E}">
+        <p14:creationId xmlns:p14="http://schemas.microsoft.com/office/powerpoint/2010/main" val="1000591932"/>
+      </p:ext>
+    </p:extLst>
+  </p:cSld>
+  <p:clrMapOvr>
+    <a:masterClrMapping/>
+  </p:clrMapOvr>
+</p:sld>
+</file>
+
+<file path=ppt/slides/slide11.xml><?xml version="1.0" encoding="utf-8"?>
+<p:sld xmlns:a="http://schemas.openxmlformats.org/drawingml/2006/main" xmlns:r="http://schemas.openxmlformats.org/officeDocument/2006/relationships" xmlns:p="http://schemas.openxmlformats.org/presentationml/2006/main">
+  <p:cSld>
+    <p:spTree>
+      <p:nvGrpSpPr>
+        <p:cNvPr id="1" name=""/>
+        <p:cNvGrpSpPr/>
+        <p:nvPr/>
+      </p:nvGrpSpPr>
+      <p:grpSpPr>
+        <a:xfrm>
+          <a:off x="0" y="0"/>
+          <a:ext cx="0" cy="0"/>
+          <a:chOff x="0" y="0"/>
+          <a:chExt cx="0" cy="0"/>
+        </a:xfrm>
+      </p:grpSpPr>
+      <p:sp>
+        <p:nvSpPr>
+          <p:cNvPr id="2" name="Title 1"/>
+          <p:cNvSpPr>
+            <a:spLocks noGrp="1"/>
+          </p:cNvSpPr>
+          <p:nvPr>
+            <p:ph type="title"/>
+          </p:nvPr>
+        </p:nvSpPr>
+        <p:spPr/>
+        <p:txBody>
+          <a:bodyPr>
+            <a:normAutofit fontScale="90000"/>
+          </a:bodyPr>
+          <a:lstStyle/>
+          <a:p>
+            <a:pPr marL="742950" indent="-742950">
+              <a:buFont typeface="+mj-lt"/>
+              <a:buAutoNum type="arabicPeriod" startAt="4"/>
+            </a:pPr>
+            <a:r>
+              <a:rPr lang="ru-RU" dirty="0" smtClean="0"/>
+              <a:t>Основополагающие принципы</a:t>
+            </a:r>
+            <a:endParaRPr lang="en-US" dirty="0"/>
+          </a:p>
+        </p:txBody>
+      </p:sp>
+      <p:sp>
+        <p:nvSpPr>
+          <p:cNvPr id="3" name="Content Placeholder 2"/>
+          <p:cNvSpPr>
+            <a:spLocks noGrp="1"/>
+          </p:cNvSpPr>
+          <p:nvPr>
+            <p:ph idx="1"/>
+          </p:nvPr>
+        </p:nvSpPr>
+        <p:spPr/>
+        <p:txBody>
+          <a:bodyPr>
+            <a:normAutofit/>
+          </a:bodyPr>
+          <a:lstStyle/>
+          <a:p>
+            <a:r>
+              <a:rPr lang="en-US" b="1" dirty="0" smtClean="0"/>
+              <a:t>Don’t </a:t>
+            </a:r>
+            <a:r>
+              <a:rPr lang="en-US" b="1" dirty="0"/>
+              <a:t>repeat yourself (DRY)</a:t>
+            </a:r>
+            <a:r>
+              <a:rPr lang="en-US" dirty="0"/>
+              <a:t>. You should only need to specify intent in one place. For example, in terms of application design, specific functionality should be implemented in only one component; the functionality should not be duplicated in any other component. </a:t>
+            </a:r>
+          </a:p>
+          <a:p>
+            <a:endParaRPr lang="en-US" dirty="0"/>
+          </a:p>
+        </p:txBody>
+      </p:sp>
+    </p:spTree>
+    <p:extLst>
+      <p:ext uri="{BB962C8B-B14F-4D97-AF65-F5344CB8AC3E}">
+        <p14:creationId xmlns:p14="http://schemas.microsoft.com/office/powerpoint/2010/main" val="3119653803"/>
+      </p:ext>
+    </p:extLst>
+  </p:cSld>
+  <p:clrMapOvr>
+    <a:masterClrMapping/>
+  </p:clrMapOvr>
+</p:sld>
+</file>
+
+<file path=ppt/slides/slide12.xml><?xml version="1.0" encoding="utf-8"?>
+<p:sld xmlns:a="http://schemas.openxmlformats.org/drawingml/2006/main" xmlns:r="http://schemas.openxmlformats.org/officeDocument/2006/relationships" xmlns:p="http://schemas.openxmlformats.org/presentationml/2006/main">
+  <p:cSld>
+    <p:spTree>
+      <p:nvGrpSpPr>
+        <p:cNvPr id="1" name=""/>
+        <p:cNvGrpSpPr/>
+        <p:nvPr/>
+      </p:nvGrpSpPr>
+      <p:grpSpPr>
+        <a:xfrm>
+          <a:off x="0" y="0"/>
+          <a:ext cx="0" cy="0"/>
+          <a:chOff x="0" y="0"/>
+          <a:chExt cx="0" cy="0"/>
+        </a:xfrm>
+      </p:grpSpPr>
+      <p:sp>
+        <p:nvSpPr>
+          <p:cNvPr id="2" name="Title 1"/>
+          <p:cNvSpPr>
+            <a:spLocks noGrp="1"/>
+          </p:cNvSpPr>
+          <p:nvPr>
+            <p:ph type="title"/>
+          </p:nvPr>
+        </p:nvSpPr>
+        <p:spPr/>
+        <p:txBody>
+          <a:bodyPr>
+            <a:normAutofit fontScale="90000"/>
+          </a:bodyPr>
+          <a:lstStyle/>
+          <a:p>
+            <a:pPr marL="742950" indent="-742950">
+              <a:buFont typeface="+mj-lt"/>
+              <a:buAutoNum type="arabicPeriod" startAt="5"/>
+            </a:pPr>
+            <a:r>
+              <a:rPr lang="ru-RU" dirty="0" smtClean="0"/>
+              <a:t>Основополагающие принципы</a:t>
+            </a:r>
+            <a:endParaRPr lang="en-US" dirty="0"/>
+          </a:p>
+        </p:txBody>
+      </p:sp>
+      <p:sp>
+        <p:nvSpPr>
+          <p:cNvPr id="3" name="Content Placeholder 2"/>
+          <p:cNvSpPr>
+            <a:spLocks noGrp="1"/>
+          </p:cNvSpPr>
+          <p:nvPr>
+            <p:ph idx="1"/>
+          </p:nvPr>
+        </p:nvSpPr>
+        <p:spPr/>
+        <p:txBody>
+          <a:bodyPr>
+            <a:normAutofit fontScale="92500" lnSpcReduction="20000"/>
+          </a:bodyPr>
+          <a:lstStyle/>
+          <a:p>
+            <a:r>
+              <a:rPr lang="en-US" b="1" dirty="0" smtClean="0"/>
+              <a:t>Minimize </a:t>
+            </a:r>
+            <a:r>
+              <a:rPr lang="en-US" b="1" dirty="0"/>
+              <a:t>upfront design. </a:t>
+            </a:r>
+            <a:r>
+              <a:rPr lang="en-US" dirty="0"/>
+              <a:t>Only design what is necessary. In some cases, you may require upfront comprehensive design and testing if the cost of development or a failure in the design is very high. In other cases, especially for agile development, you can avoid big design upfront (BDUF). If your application requirements are unclear, or if there is a possibility of the design evolving over time, avoid making a large design effort prematurely. This principle is sometimes known as YAGNI ("You </a:t>
+            </a:r>
+            <a:r>
+              <a:rPr lang="en-US" dirty="0" err="1"/>
+              <a:t>ain’t</a:t>
+            </a:r>
+            <a:r>
+              <a:rPr lang="en-US" dirty="0"/>
+              <a:t> </a:t>
+            </a:r>
+            <a:r>
+              <a:rPr lang="en-US" dirty="0" err="1"/>
+              <a:t>gonna</a:t>
+            </a:r>
+            <a:r>
+              <a:rPr lang="en-US" dirty="0"/>
+              <a:t> need it").</a:t>
+            </a:r>
+          </a:p>
+          <a:p>
+            <a:endParaRPr lang="en-US" dirty="0"/>
+          </a:p>
+        </p:txBody>
+      </p:sp>
+    </p:spTree>
+    <p:extLst>
+      <p:ext uri="{BB962C8B-B14F-4D97-AF65-F5344CB8AC3E}">
+        <p14:creationId xmlns:p14="http://schemas.microsoft.com/office/powerpoint/2010/main" val="1171042694"/>
+      </p:ext>
+    </p:extLst>
+  </p:cSld>
+  <p:clrMapOvr>
+    <a:masterClrMapping/>
+  </p:clrMapOvr>
+</p:sld>
+</file>
+
+<file path=ppt/slides/slide13.xml><?xml version="1.0" encoding="utf-8"?>
+<p:sld xmlns:a="http://schemas.openxmlformats.org/drawingml/2006/main" xmlns:r="http://schemas.openxmlformats.org/officeDocument/2006/relationships" xmlns:p="http://schemas.openxmlformats.org/presentationml/2006/main">
+  <p:cSld>
+    <p:spTree>
+      <p:nvGrpSpPr>
+        <p:cNvPr id="1" name=""/>
+        <p:cNvGrpSpPr/>
+        <p:nvPr/>
+      </p:nvGrpSpPr>
+      <p:grpSpPr>
+        <a:xfrm>
+          <a:off x="0" y="0"/>
+          <a:ext cx="0" cy="0"/>
+          <a:chOff x="0" y="0"/>
+          <a:chExt cx="0" cy="0"/>
+        </a:xfrm>
+      </p:grpSpPr>
+      <p:sp>
+        <p:nvSpPr>
+          <p:cNvPr id="2" name="Title 1"/>
+          <p:cNvSpPr>
+            <a:spLocks noGrp="1"/>
+          </p:cNvSpPr>
+          <p:nvPr>
+            <p:ph type="title"/>
+          </p:nvPr>
+        </p:nvSpPr>
+        <p:spPr/>
+        <p:txBody>
+          <a:bodyPr/>
+          <a:lstStyle/>
+          <a:p>
+            <a:r>
+              <a:rPr lang="ru-RU" dirty="0" smtClean="0"/>
+              <a:t>Жизненный цикл ПО</a:t>
+            </a:r>
+            <a:endParaRPr lang="en-US" dirty="0"/>
+          </a:p>
+        </p:txBody>
+      </p:sp>
+      <p:sp>
+        <p:nvSpPr>
+          <p:cNvPr id="3" name="Content Placeholder 2"/>
+          <p:cNvSpPr>
+            <a:spLocks noGrp="1"/>
+          </p:cNvSpPr>
+          <p:nvPr>
+            <p:ph idx="1"/>
+          </p:nvPr>
+        </p:nvSpPr>
+        <p:spPr/>
+        <p:txBody>
+          <a:bodyPr>
+            <a:normAutofit fontScale="92500" lnSpcReduction="20000"/>
+          </a:bodyPr>
+          <a:lstStyle/>
+          <a:p>
+            <a:r>
+              <a:rPr lang="ru-RU" dirty="0" smtClean="0"/>
+              <a:t>Требования (</a:t>
+            </a:r>
+            <a:r>
+              <a:rPr lang="en-US" dirty="0" smtClean="0"/>
+              <a:t>Requirements</a:t>
+            </a:r>
+            <a:r>
+              <a:rPr lang="ru-RU" dirty="0" smtClean="0"/>
+              <a:t>)</a:t>
+            </a:r>
+            <a:endParaRPr lang="en-US" dirty="0"/>
+          </a:p>
+          <a:p>
+            <a:r>
+              <a:rPr lang="ru-RU" dirty="0" smtClean="0"/>
+              <a:t>Спецификация (</a:t>
+            </a:r>
+            <a:r>
+              <a:rPr lang="en-US" dirty="0" smtClean="0"/>
+              <a:t>Specification</a:t>
+            </a:r>
+            <a:r>
+              <a:rPr lang="ru-RU" dirty="0" smtClean="0"/>
+              <a:t>)</a:t>
+            </a:r>
+            <a:endParaRPr lang="en-US" dirty="0"/>
+          </a:p>
+          <a:p>
+            <a:r>
+              <a:rPr lang="ru-RU" dirty="0" smtClean="0"/>
+              <a:t>Архитектура (</a:t>
+            </a:r>
+            <a:r>
+              <a:rPr lang="en-US" dirty="0" smtClean="0"/>
+              <a:t>Architecture</a:t>
+            </a:r>
+            <a:r>
+              <a:rPr lang="ru-RU" dirty="0" smtClean="0"/>
+              <a:t>)</a:t>
+            </a:r>
+            <a:endParaRPr lang="en-US" dirty="0"/>
+          </a:p>
+          <a:p>
+            <a:r>
+              <a:rPr lang="ru-RU" dirty="0" smtClean="0"/>
+              <a:t>Дизайн (</a:t>
+            </a:r>
+            <a:r>
+              <a:rPr lang="en-US" dirty="0" smtClean="0"/>
+              <a:t>Design</a:t>
+            </a:r>
+            <a:r>
+              <a:rPr lang="ru-RU" dirty="0" smtClean="0"/>
+              <a:t>)</a:t>
+            </a:r>
+            <a:endParaRPr lang="en-US" dirty="0"/>
+          </a:p>
+          <a:p>
+            <a:r>
+              <a:rPr lang="ru-RU" dirty="0" smtClean="0"/>
+              <a:t>Программирование (</a:t>
+            </a:r>
+            <a:r>
+              <a:rPr lang="en-US" dirty="0" smtClean="0"/>
+              <a:t>Implementation</a:t>
+            </a:r>
+            <a:r>
+              <a:rPr lang="ru-RU" dirty="0" smtClean="0"/>
+              <a:t>)</a:t>
+            </a:r>
+            <a:endParaRPr lang="en-US" dirty="0"/>
+          </a:p>
+          <a:p>
+            <a:r>
+              <a:rPr lang="ru-RU" dirty="0" smtClean="0"/>
+              <a:t>Тестирование (</a:t>
+            </a:r>
+            <a:r>
+              <a:rPr lang="en-US" dirty="0" smtClean="0"/>
+              <a:t>Testing</a:t>
+            </a:r>
+            <a:r>
+              <a:rPr lang="ru-RU" dirty="0" smtClean="0"/>
+              <a:t>)</a:t>
+            </a:r>
+            <a:endParaRPr lang="en-US" dirty="0"/>
+          </a:p>
+          <a:p>
+            <a:r>
+              <a:rPr lang="ru-RU" dirty="0" smtClean="0"/>
+              <a:t>Отладка (</a:t>
+            </a:r>
+            <a:r>
+              <a:rPr lang="en-US" dirty="0" smtClean="0"/>
+              <a:t>Debugging</a:t>
+            </a:r>
+            <a:r>
+              <a:rPr lang="ru-RU" dirty="0" smtClean="0"/>
+              <a:t>)</a:t>
+            </a:r>
+            <a:endParaRPr lang="en-US" dirty="0"/>
+          </a:p>
+          <a:p>
+            <a:r>
+              <a:rPr lang="ru-RU" dirty="0" smtClean="0"/>
+              <a:t>Дистрибутив (</a:t>
+            </a:r>
+            <a:r>
+              <a:rPr lang="en-US" dirty="0" smtClean="0"/>
+              <a:t>Deployment</a:t>
+            </a:r>
+            <a:r>
+              <a:rPr lang="ru-RU" dirty="0" smtClean="0"/>
+              <a:t>)</a:t>
+            </a:r>
+            <a:endParaRPr lang="en-US" dirty="0" smtClean="0"/>
+          </a:p>
+          <a:p>
+            <a:r>
+              <a:rPr lang="ru-RU" dirty="0" smtClean="0"/>
+              <a:t>Сопровождение (</a:t>
+            </a:r>
+            <a:r>
+              <a:rPr lang="en-US" dirty="0" smtClean="0"/>
+              <a:t>Maintenance</a:t>
+            </a:r>
+            <a:r>
+              <a:rPr lang="ru-RU" dirty="0" smtClean="0"/>
+              <a:t>)</a:t>
+            </a:r>
+            <a:endParaRPr lang="en-US" dirty="0"/>
+          </a:p>
+        </p:txBody>
+      </p:sp>
+    </p:spTree>
+    <p:extLst>
+      <p:ext uri="{BB962C8B-B14F-4D97-AF65-F5344CB8AC3E}">
+        <p14:creationId xmlns:p14="http://schemas.microsoft.com/office/powerpoint/2010/main" val="3256343997"/>
+      </p:ext>
+    </p:extLst>
+  </p:cSld>
+  <p:clrMapOvr>
+    <a:masterClrMapping/>
+  </p:clrMapOvr>
+</p:sld>
+</file>
+
+<file path=ppt/slides/slide14.xml><?xml version="1.0" encoding="utf-8"?>
+<p:sld xmlns:a="http://schemas.openxmlformats.org/drawingml/2006/main" xmlns:r="http://schemas.openxmlformats.org/officeDocument/2006/relationships" xmlns:p="http://schemas.openxmlformats.org/presentationml/2006/main">
+  <p:cSld>
+    <p:spTree>
+      <p:nvGrpSpPr>
+        <p:cNvPr id="1" name=""/>
+        <p:cNvGrpSpPr/>
+        <p:nvPr/>
+      </p:nvGrpSpPr>
+      <p:grpSpPr>
+        <a:xfrm>
+          <a:off x="0" y="0"/>
+          <a:ext cx="0" cy="0"/>
+          <a:chOff x="0" y="0"/>
+          <a:chExt cx="0" cy="0"/>
+        </a:xfrm>
+      </p:grpSpPr>
+      <p:sp>
+        <p:nvSpPr>
+          <p:cNvPr id="2" name="Title 1"/>
+          <p:cNvSpPr>
+            <a:spLocks noGrp="1"/>
+          </p:cNvSpPr>
+          <p:nvPr>
+            <p:ph type="title"/>
+          </p:nvPr>
+        </p:nvSpPr>
+        <p:spPr/>
+        <p:txBody>
+          <a:bodyPr>
+            <a:normAutofit fontScale="90000"/>
+          </a:bodyPr>
+          <a:lstStyle/>
+          <a:p>
+            <a:r>
+              <a:rPr lang="ru-RU" dirty="0"/>
+              <a:t>Цикл разработки программного обеспечения</a:t>
+            </a:r>
+            <a:endParaRPr lang="en-US" dirty="0"/>
+          </a:p>
+        </p:txBody>
+      </p:sp>
+      <p:sp>
+        <p:nvSpPr>
+          <p:cNvPr id="3" name="Content Placeholder 2"/>
+          <p:cNvSpPr>
+            <a:spLocks noGrp="1"/>
+          </p:cNvSpPr>
+          <p:nvPr>
+            <p:ph idx="1"/>
+          </p:nvPr>
+        </p:nvSpPr>
+        <p:spPr/>
+        <p:txBody>
+          <a:bodyPr/>
+          <a:lstStyle/>
+          <a:p>
+            <a:r>
+              <a:rPr lang="ru-RU" dirty="0" smtClean="0"/>
+              <a:t>Водопад</a:t>
+            </a:r>
+          </a:p>
+          <a:p>
+            <a:r>
+              <a:rPr lang="ru-RU" dirty="0" smtClean="0"/>
+              <a:t>Спираль</a:t>
+            </a:r>
+          </a:p>
+          <a:p>
+            <a:r>
+              <a:rPr lang="ru-RU" dirty="0" smtClean="0"/>
+              <a:t>Гибкая модель</a:t>
+            </a:r>
+            <a:endParaRPr lang="en-US" dirty="0"/>
+          </a:p>
+        </p:txBody>
+      </p:sp>
+    </p:spTree>
+    <p:extLst>
+      <p:ext uri="{BB962C8B-B14F-4D97-AF65-F5344CB8AC3E}">
+        <p14:creationId xmlns:p14="http://schemas.microsoft.com/office/powerpoint/2010/main" val="3295934606"/>
+      </p:ext>
+    </p:extLst>
+  </p:cSld>
+  <p:clrMapOvr>
+    <a:masterClrMapping/>
+  </p:clrMapOvr>
+</p:sld>
+</file>
+
+<file path=ppt/slides/slide15.xml><?xml version="1.0" encoding="utf-8"?>
+<p:sld xmlns:a="http://schemas.openxmlformats.org/drawingml/2006/main" xmlns:r="http://schemas.openxmlformats.org/officeDocument/2006/relationships" xmlns:p="http://schemas.openxmlformats.org/presentationml/2006/main">
+  <p:cSld>
+    <p:spTree>
+      <p:nvGrpSpPr>
+        <p:cNvPr id="1" name=""/>
+        <p:cNvGrpSpPr/>
+        <p:nvPr/>
+      </p:nvGrpSpPr>
+      <p:grpSpPr>
+        <a:xfrm>
+          <a:off x="0" y="0"/>
+          <a:ext cx="0" cy="0"/>
+          <a:chOff x="0" y="0"/>
+          <a:chExt cx="0" cy="0"/>
+        </a:xfrm>
+      </p:grpSpPr>
+      <p:sp>
+        <p:nvSpPr>
+          <p:cNvPr id="2" name="Title 1"/>
+          <p:cNvSpPr>
+            <a:spLocks noGrp="1"/>
+          </p:cNvSpPr>
+          <p:nvPr>
+            <p:ph type="title"/>
+          </p:nvPr>
+        </p:nvSpPr>
+        <p:spPr/>
+        <p:txBody>
+          <a:bodyPr/>
+          <a:lstStyle/>
+          <a:p>
+            <a:r>
+              <a:rPr lang="ru-RU" dirty="0" smtClean="0"/>
+              <a:t>«Водопад» (</a:t>
+            </a:r>
+            <a:r>
+              <a:rPr lang="en-US" dirty="0" smtClean="0"/>
+              <a:t>Waterfall</a:t>
+            </a:r>
+            <a:r>
+              <a:rPr lang="ru-RU" dirty="0" smtClean="0"/>
+              <a:t>)</a:t>
+            </a:r>
+            <a:endParaRPr lang="en-US" dirty="0"/>
+          </a:p>
+        </p:txBody>
+      </p:sp>
+      <p:pic>
+        <p:nvPicPr>
+          <p:cNvPr id="4098" name="Picture 2" descr="http://upload.wikimedia.org/wikipedia/commons/thumb/0/06/Waterfall_model_%281%29.svg/500px-Waterfall_model_%281%29.svg.png"/>
+          <p:cNvPicPr>
+            <a:picLocks noChangeAspect="1" noChangeArrowheads="1"/>
+          </p:cNvPicPr>
+          <p:nvPr/>
+        </p:nvPicPr>
+        <p:blipFill>
+          <a:blip r:embed="rId2">
+            <a:extLst>
+              <a:ext uri="{28A0092B-C50C-407E-A947-70E740481C1C}">
+                <a14:useLocalDpi xmlns:a14="http://schemas.microsoft.com/office/drawing/2010/main" val="0"/>
+              </a:ext>
+            </a:extLst>
+          </a:blip>
+          <a:srcRect/>
+          <a:stretch>
+            <a:fillRect/>
+          </a:stretch>
+        </p:blipFill>
+        <p:spPr bwMode="auto">
+          <a:xfrm>
+            <a:off x="2190750" y="1772816"/>
+            <a:ext cx="4762500" cy="3571875"/>
+          </a:xfrm>
+          <a:prstGeom prst="rect">
+            <a:avLst/>
+          </a:prstGeom>
+          <a:noFill/>
+          <a:extLst>
+            <a:ext uri="{909E8E84-426E-40DD-AFC4-6F175D3DCCD1}">
+              <a14:hiddenFill xmlns:a14="http://schemas.microsoft.com/office/drawing/2010/main">
+                <a:solidFill>
+                  <a:srgbClr val="FFFFFF"/>
+                </a:solidFill>
+              </a14:hiddenFill>
+            </a:ext>
+          </a:extLst>
+        </p:spPr>
+      </p:pic>
+    </p:spTree>
+    <p:extLst>
+      <p:ext uri="{BB962C8B-B14F-4D97-AF65-F5344CB8AC3E}">
+        <p14:creationId xmlns:p14="http://schemas.microsoft.com/office/powerpoint/2010/main" val="4057089775"/>
+      </p:ext>
+    </p:extLst>
+  </p:cSld>
+  <p:clrMapOvr>
+    <a:masterClrMapping/>
+  </p:clrMapOvr>
+</p:sld>
+</file>
+
+<file path=ppt/slides/slide16.xml><?xml version="1.0" encoding="utf-8"?>
+<p:sld xmlns:a="http://schemas.openxmlformats.org/drawingml/2006/main" xmlns:r="http://schemas.openxmlformats.org/officeDocument/2006/relationships" xmlns:p="http://schemas.openxmlformats.org/presentationml/2006/main">
+  <p:cSld>
+    <p:bg>
+      <p:bgPr>
+        <a:solidFill>
+          <a:schemeClr val="accent1"/>
+        </a:solidFill>
+        <a:effectLst/>
+      </p:bgPr>
+    </p:bg>
+    <p:spTree>
+      <p:nvGrpSpPr>
+        <p:cNvPr id="1" name=""/>
+        <p:cNvGrpSpPr/>
+        <p:nvPr/>
+      </p:nvGrpSpPr>
+      <p:grpSpPr>
+        <a:xfrm>
+          <a:off x="0" y="0"/>
+          <a:ext cx="0" cy="0"/>
+          <a:chOff x="0" y="0"/>
+          <a:chExt cx="0" cy="0"/>
+        </a:xfrm>
+      </p:grpSpPr>
+      <p:sp>
+        <p:nvSpPr>
+          <p:cNvPr id="2" name="Title 1"/>
+          <p:cNvSpPr>
+            <a:spLocks noGrp="1"/>
+          </p:cNvSpPr>
+          <p:nvPr>
+            <p:ph type="title"/>
+          </p:nvPr>
+        </p:nvSpPr>
+        <p:spPr/>
+        <p:txBody>
+          <a:bodyPr/>
+          <a:lstStyle/>
+          <a:p>
+            <a:r>
+              <a:rPr lang="ru-RU" dirty="0" smtClean="0">
+                <a:solidFill>
+                  <a:srgbClr val="000000"/>
+                </a:solidFill>
+              </a:rPr>
+              <a:t>Спираль</a:t>
+            </a:r>
+            <a:endParaRPr lang="en-US" dirty="0">
+              <a:solidFill>
+                <a:srgbClr val="000000"/>
+              </a:solidFill>
+            </a:endParaRPr>
+          </a:p>
+        </p:txBody>
+      </p:sp>
+      <p:pic>
+        <p:nvPicPr>
+          <p:cNvPr id="5122" name="Picture 2" descr="http://upload.wikimedia.org/wikipedia/commons/thumb/e/ec/Spiral_model_%28Boehm%2C_1988%29.svg/500px-Spiral_model_%28Boehm%2C_1988%29.svg.png"/>
+          <p:cNvPicPr>
+            <a:picLocks noChangeAspect="1" noChangeArrowheads="1"/>
+          </p:cNvPicPr>
+          <p:nvPr/>
+        </p:nvPicPr>
+        <p:blipFill>
+          <a:blip r:embed="rId2">
+            <a:extLst>
+              <a:ext uri="{28A0092B-C50C-407E-A947-70E740481C1C}">
+                <a14:useLocalDpi xmlns:a14="http://schemas.microsoft.com/office/drawing/2010/main" val="0"/>
+              </a:ext>
+            </a:extLst>
+          </a:blip>
+          <a:srcRect/>
+          <a:stretch>
+            <a:fillRect/>
+          </a:stretch>
+        </p:blipFill>
+        <p:spPr bwMode="auto">
+          <a:xfrm>
+            <a:off x="2190750" y="1443038"/>
+            <a:ext cx="4762500" cy="3971925"/>
+          </a:xfrm>
+          <a:prstGeom prst="rect">
+            <a:avLst/>
+          </a:prstGeom>
+          <a:noFill/>
+          <a:extLst>
+            <a:ext uri="{909E8E84-426E-40DD-AFC4-6F175D3DCCD1}">
+              <a14:hiddenFill xmlns:a14="http://schemas.microsoft.com/office/drawing/2010/main">
+                <a:solidFill>
+                  <a:srgbClr val="FFFFFF"/>
+                </a:solidFill>
+              </a14:hiddenFill>
+            </a:ext>
+          </a:extLst>
+        </p:spPr>
+      </p:pic>
+    </p:spTree>
+    <p:extLst>
+      <p:ext uri="{BB962C8B-B14F-4D97-AF65-F5344CB8AC3E}">
+        <p14:creationId xmlns:p14="http://schemas.microsoft.com/office/powerpoint/2010/main" val="658520332"/>
+      </p:ext>
+    </p:extLst>
+  </p:cSld>
+  <p:clrMapOvr>
+    <a:masterClrMapping/>
+  </p:clrMapOvr>
+</p:sld>
+</file>
+
+<file path=ppt/slides/slide17.xml><?xml version="1.0" encoding="utf-8"?>
+<p:sld xmlns:a="http://schemas.openxmlformats.org/drawingml/2006/main" xmlns:r="http://schemas.openxmlformats.org/officeDocument/2006/relationships" xmlns:p="http://schemas.openxmlformats.org/presentationml/2006/main">
+  <p:cSld>
+    <p:bg>
+      <p:bgPr>
+        <a:solidFill>
+          <a:schemeClr val="accent1"/>
+        </a:solidFill>
+        <a:effectLst/>
+      </p:bgPr>
+    </p:bg>
+    <p:spTree>
+      <p:nvGrpSpPr>
+        <p:cNvPr id="1" name=""/>
+        <p:cNvGrpSpPr/>
+        <p:nvPr/>
+      </p:nvGrpSpPr>
+      <p:grpSpPr>
+        <a:xfrm>
+          <a:off x="0" y="0"/>
+          <a:ext cx="0" cy="0"/>
+          <a:chOff x="0" y="0"/>
+          <a:chExt cx="0" cy="0"/>
+        </a:xfrm>
+      </p:grpSpPr>
+      <p:sp>
+        <p:nvSpPr>
+          <p:cNvPr id="2" name="Title 1"/>
+          <p:cNvSpPr>
+            <a:spLocks noGrp="1"/>
+          </p:cNvSpPr>
+          <p:nvPr>
+            <p:ph type="title"/>
+          </p:nvPr>
+        </p:nvSpPr>
+        <p:spPr/>
+        <p:txBody>
+          <a:bodyPr/>
+          <a:lstStyle/>
+          <a:p>
+            <a:r>
+              <a:rPr lang="ru-RU" dirty="0" smtClean="0">
+                <a:solidFill>
+                  <a:srgbClr val="000000"/>
+                </a:solidFill>
+              </a:rPr>
+              <a:t>Гибкая модель </a:t>
+            </a:r>
+            <a:r>
+              <a:rPr lang="en-US" dirty="0" smtClean="0">
+                <a:solidFill>
+                  <a:srgbClr val="000000"/>
+                </a:solidFill>
+              </a:rPr>
+              <a:t>(Agile)</a:t>
+            </a:r>
+            <a:endParaRPr lang="en-US" dirty="0">
+              <a:solidFill>
+                <a:srgbClr val="000000"/>
+              </a:solidFill>
+            </a:endParaRPr>
+          </a:p>
+        </p:txBody>
+      </p:sp>
+      <p:pic>
+        <p:nvPicPr>
+          <p:cNvPr id="6146" name="Picture 2" descr="http://upload.wikimedia.org/wikipedia/commons/thumb/8/89/Agile_Software_Development_methodology.svg/486px-Agile_Software_Development_methodology.svg.png"/>
+          <p:cNvPicPr>
+            <a:picLocks noChangeAspect="1" noChangeArrowheads="1"/>
+          </p:cNvPicPr>
+          <p:nvPr/>
+        </p:nvPicPr>
+        <p:blipFill rotWithShape="1">
+          <a:blip r:embed="rId2">
+            <a:extLst>
+              <a:ext uri="{28A0092B-C50C-407E-A947-70E740481C1C}">
+                <a14:useLocalDpi xmlns:a14="http://schemas.microsoft.com/office/drawing/2010/main" val="0"/>
+              </a:ext>
+            </a:extLst>
+          </a:blip>
+          <a:srcRect l="-199" t="11706" r="199" b="8892"/>
+          <a:stretch/>
+        </p:blipFill>
+        <p:spPr bwMode="auto">
+          <a:xfrm>
+            <a:off x="2257425" y="1483471"/>
+            <a:ext cx="4629150" cy="4537817"/>
+          </a:xfrm>
+          <a:prstGeom prst="rect">
+            <a:avLst/>
+          </a:prstGeom>
+          <a:noFill/>
+          <a:extLst>
+            <a:ext uri="{909E8E84-426E-40DD-AFC4-6F175D3DCCD1}">
+              <a14:hiddenFill xmlns:a14="http://schemas.microsoft.com/office/drawing/2010/main">
+                <a:solidFill>
+                  <a:srgbClr val="FFFFFF"/>
+                </a:solidFill>
+              </a14:hiddenFill>
+            </a:ext>
+          </a:extLst>
+        </p:spPr>
+      </p:pic>
+    </p:spTree>
+    <p:extLst>
+      <p:ext uri="{BB962C8B-B14F-4D97-AF65-F5344CB8AC3E}">
+        <p14:creationId xmlns:p14="http://schemas.microsoft.com/office/powerpoint/2010/main" val="2094657234"/>
+      </p:ext>
+    </p:extLst>
+  </p:cSld>
+  <p:clrMapOvr>
+    <a:masterClrMapping/>
+  </p:clrMapOvr>
+</p:sld>
+</file>
+
+<file path=ppt/slides/slide18.xml><?xml version="1.0" encoding="utf-8"?>
+<p:sld xmlns:a="http://schemas.openxmlformats.org/drawingml/2006/main" xmlns:r="http://schemas.openxmlformats.org/officeDocument/2006/relationships" xmlns:p="http://schemas.openxmlformats.org/presentationml/2006/main">
+  <p:cSld>
+    <p:spTree>
+      <p:nvGrpSpPr>
+        <p:cNvPr id="1" name=""/>
+        <p:cNvGrpSpPr/>
+        <p:nvPr/>
+      </p:nvGrpSpPr>
+      <p:grpSpPr>
+        <a:xfrm>
+          <a:off x="0" y="0"/>
+          <a:ext cx="0" cy="0"/>
+          <a:chOff x="0" y="0"/>
+          <a:chExt cx="0" cy="0"/>
+        </a:xfrm>
+      </p:grpSpPr>
+      <p:sp>
+        <p:nvSpPr>
+          <p:cNvPr id="2" name="Title 1"/>
+          <p:cNvSpPr>
+            <a:spLocks noGrp="1"/>
+          </p:cNvSpPr>
+          <p:nvPr>
+            <p:ph type="title"/>
+          </p:nvPr>
+        </p:nvSpPr>
+        <p:spPr/>
+        <p:txBody>
+          <a:bodyPr/>
+          <a:lstStyle/>
+          <a:p>
+            <a:r>
+              <a:rPr lang="ru-RU" dirty="0" smtClean="0"/>
+              <a:t>Процесс разработки ПО</a:t>
+            </a:r>
+            <a:endParaRPr lang="en-US" dirty="0"/>
+          </a:p>
+        </p:txBody>
+      </p:sp>
+      <p:sp>
+        <p:nvSpPr>
+          <p:cNvPr id="3" name="Content Placeholder 2"/>
+          <p:cNvSpPr>
+            <a:spLocks noGrp="1"/>
+          </p:cNvSpPr>
+          <p:nvPr>
+            <p:ph idx="1"/>
+          </p:nvPr>
+        </p:nvSpPr>
+        <p:spPr/>
+        <p:txBody>
+          <a:bodyPr/>
+          <a:lstStyle/>
+          <a:p>
+            <a:r>
+              <a:rPr lang="en-US" dirty="0" smtClean="0"/>
+              <a:t>Test Driven Development (</a:t>
+            </a:r>
+            <a:r>
+              <a:rPr lang="ru-RU" dirty="0" smtClean="0"/>
+              <a:t>управляемое тестами)</a:t>
+            </a:r>
+          </a:p>
+          <a:p>
+            <a:r>
+              <a:rPr lang="en-US" dirty="0" smtClean="0"/>
+              <a:t>Continuous Integration (CI)</a:t>
+            </a:r>
+            <a:endParaRPr lang="en-US" dirty="0"/>
+          </a:p>
+        </p:txBody>
+      </p:sp>
+    </p:spTree>
+    <p:extLst>
+      <p:ext uri="{BB962C8B-B14F-4D97-AF65-F5344CB8AC3E}">
+        <p14:creationId xmlns:p14="http://schemas.microsoft.com/office/powerpoint/2010/main" val="3800880669"/>
+      </p:ext>
+    </p:extLst>
+  </p:cSld>
+  <p:clrMapOvr>
+    <a:masterClrMapping/>
+  </p:clrMapOvr>
+</p:sld>
+</file>
+
+<file path=ppt/slides/slide19.xml><?xml version="1.0" encoding="utf-8"?>
+<p:sld xmlns:a="http://schemas.openxmlformats.org/drawingml/2006/main" xmlns:r="http://schemas.openxmlformats.org/officeDocument/2006/relationships" xmlns:p="http://schemas.openxmlformats.org/presentationml/2006/main">
+  <p:cSld>
+    <p:spTree>
+      <p:nvGrpSpPr>
+        <p:cNvPr id="1" name=""/>
+        <p:cNvGrpSpPr/>
+        <p:nvPr/>
+      </p:nvGrpSpPr>
+      <p:grpSpPr>
+        <a:xfrm>
+          <a:off x="0" y="0"/>
+          <a:ext cx="0" cy="0"/>
+          <a:chOff x="0" y="0"/>
+          <a:chExt cx="0" cy="0"/>
+        </a:xfrm>
+      </p:grpSpPr>
+      <p:sp>
+        <p:nvSpPr>
+          <p:cNvPr id="2" name="Title 1"/>
+          <p:cNvSpPr>
+            <a:spLocks noGrp="1"/>
+          </p:cNvSpPr>
+          <p:nvPr>
+            <p:ph type="title"/>
+          </p:nvPr>
+        </p:nvSpPr>
+        <p:spPr/>
+        <p:txBody>
+          <a:bodyPr/>
+          <a:lstStyle/>
+          <a:p>
+            <a:r>
+              <a:rPr lang="ru-RU" dirty="0" smtClean="0"/>
+              <a:t>Тест Джоеля</a:t>
+            </a:r>
+            <a:endParaRPr lang="en-US" dirty="0"/>
+          </a:p>
+        </p:txBody>
+      </p:sp>
+      <p:sp>
+        <p:nvSpPr>
+          <p:cNvPr id="3" name="Content Placeholder 2"/>
+          <p:cNvSpPr>
+            <a:spLocks noGrp="1"/>
+          </p:cNvSpPr>
+          <p:nvPr>
+            <p:ph idx="1"/>
+          </p:nvPr>
+        </p:nvSpPr>
+        <p:spPr/>
+        <p:txBody>
+          <a:bodyPr>
+            <a:normAutofit fontScale="62500" lnSpcReduction="20000"/>
+          </a:bodyPr>
+          <a:lstStyle/>
+          <a:p>
+            <a:pPr marL="514350" indent="-514350">
+              <a:buFont typeface="+mj-lt"/>
+              <a:buAutoNum type="arabicPeriod"/>
+            </a:pPr>
+            <a:r>
+              <a:rPr lang="en-US" dirty="0"/>
+              <a:t>Do you use source control? </a:t>
+            </a:r>
+          </a:p>
+          <a:p>
+            <a:pPr marL="514350" indent="-514350">
+              <a:buFont typeface="+mj-lt"/>
+              <a:buAutoNum type="arabicPeriod"/>
+            </a:pPr>
+            <a:r>
+              <a:rPr lang="en-US" dirty="0"/>
+              <a:t>Can you make a build in one step? </a:t>
+            </a:r>
+          </a:p>
+          <a:p>
+            <a:pPr marL="514350" indent="-514350">
+              <a:buFont typeface="+mj-lt"/>
+              <a:buAutoNum type="arabicPeriod"/>
+            </a:pPr>
+            <a:r>
+              <a:rPr lang="en-US" dirty="0"/>
+              <a:t>Do you make daily builds? </a:t>
+            </a:r>
+          </a:p>
+          <a:p>
+            <a:pPr marL="514350" indent="-514350">
+              <a:buFont typeface="+mj-lt"/>
+              <a:buAutoNum type="arabicPeriod"/>
+            </a:pPr>
+            <a:r>
+              <a:rPr lang="en-US" dirty="0"/>
+              <a:t>Do you have a bug database? </a:t>
+            </a:r>
+          </a:p>
+          <a:p>
+            <a:pPr marL="514350" indent="-514350">
+              <a:buFont typeface="+mj-lt"/>
+              <a:buAutoNum type="arabicPeriod"/>
+            </a:pPr>
+            <a:r>
+              <a:rPr lang="en-US" dirty="0"/>
+              <a:t>Do you fix bugs before writing new code? </a:t>
+            </a:r>
+          </a:p>
+          <a:p>
+            <a:pPr marL="514350" indent="-514350">
+              <a:buFont typeface="+mj-lt"/>
+              <a:buAutoNum type="arabicPeriod"/>
+            </a:pPr>
+            <a:r>
+              <a:rPr lang="en-US" dirty="0"/>
+              <a:t>Do you have an up-to-date schedule? </a:t>
+            </a:r>
+          </a:p>
+          <a:p>
+            <a:pPr marL="514350" indent="-514350">
+              <a:buFont typeface="+mj-lt"/>
+              <a:buAutoNum type="arabicPeriod"/>
+            </a:pPr>
+            <a:r>
+              <a:rPr lang="en-US" dirty="0"/>
+              <a:t>Do you have a spec? </a:t>
+            </a:r>
+          </a:p>
+          <a:p>
+            <a:pPr marL="514350" indent="-514350">
+              <a:buFont typeface="+mj-lt"/>
+              <a:buAutoNum type="arabicPeriod"/>
+            </a:pPr>
+            <a:r>
+              <a:rPr lang="en-US" dirty="0"/>
+              <a:t>Do programmers have quiet working conditions? </a:t>
+            </a:r>
+          </a:p>
+          <a:p>
+            <a:pPr marL="514350" indent="-514350">
+              <a:buFont typeface="+mj-lt"/>
+              <a:buAutoNum type="arabicPeriod"/>
+            </a:pPr>
+            <a:r>
+              <a:rPr lang="en-US" dirty="0"/>
+              <a:t>Do you use the best tools money can buy? </a:t>
+            </a:r>
+          </a:p>
+          <a:p>
+            <a:pPr marL="514350" indent="-514350">
+              <a:buFont typeface="+mj-lt"/>
+              <a:buAutoNum type="arabicPeriod"/>
+            </a:pPr>
+            <a:r>
+              <a:rPr lang="en-US" dirty="0"/>
+              <a:t>Do you have testers? </a:t>
+            </a:r>
+          </a:p>
+          <a:p>
+            <a:pPr marL="514350" indent="-514350">
+              <a:buFont typeface="+mj-lt"/>
+              <a:buAutoNum type="arabicPeriod"/>
+            </a:pPr>
+            <a:r>
+              <a:rPr lang="en-US" dirty="0"/>
+              <a:t>Do new candidates write code during their interview? </a:t>
+            </a:r>
+          </a:p>
+          <a:p>
+            <a:pPr marL="514350" indent="-514350">
+              <a:buFont typeface="+mj-lt"/>
+              <a:buAutoNum type="arabicPeriod"/>
+            </a:pPr>
+            <a:r>
+              <a:rPr lang="en-US" dirty="0"/>
+              <a:t>Do you do hallway usability testing</a:t>
+            </a:r>
+            <a:r>
+              <a:rPr lang="en-US" dirty="0" smtClean="0"/>
+              <a:t>?</a:t>
+            </a:r>
+            <a:endParaRPr lang="ru-RU" dirty="0" smtClean="0"/>
+          </a:p>
+          <a:p>
+            <a:pPr marL="0" indent="0">
+              <a:buNone/>
+            </a:pPr>
+            <a:endParaRPr lang="ru-RU" dirty="0"/>
+          </a:p>
+          <a:p>
+            <a:pPr marL="0" indent="0">
+              <a:buNone/>
+            </a:pPr>
+            <a:r>
+              <a:rPr lang="en-US" dirty="0">
+                <a:hlinkClick r:id="rId2"/>
+              </a:rPr>
+              <a:t>http://</a:t>
+            </a:r>
+            <a:r>
+              <a:rPr lang="en-US" dirty="0" smtClean="0">
+                <a:hlinkClick r:id="rId2"/>
+              </a:rPr>
+              <a:t>www.joelonsoftware.com/articles/fog0000000043.html</a:t>
+            </a:r>
+            <a:endParaRPr lang="en-US" dirty="0"/>
+          </a:p>
+        </p:txBody>
+      </p:sp>
+    </p:spTree>
+    <p:extLst>
+      <p:ext uri="{BB962C8B-B14F-4D97-AF65-F5344CB8AC3E}">
+        <p14:creationId xmlns:p14="http://schemas.microsoft.com/office/powerpoint/2010/main" val="3522902622"/>
+      </p:ext>
+    </p:extLst>
+  </p:cSld>
+  <p:clrMapOvr>
+    <a:masterClrMapping/>
+  </p:clrMapOvr>
+</p:sld>
+</file>
+
+<file path=ppt/slides/slide2.xml><?xml version="1.0" encoding="utf-8"?>
+<p:sld xmlns:a="http://schemas.openxmlformats.org/drawingml/2006/main" xmlns:r="http://schemas.openxmlformats.org/officeDocument/2006/relationships" xmlns:p="http://schemas.openxmlformats.org/presentationml/2006/main">
+  <p:cSld>
+    <p:spTree>
+      <p:nvGrpSpPr>
+        <p:cNvPr id="1" name=""/>
+        <p:cNvGrpSpPr/>
+        <p:nvPr/>
+      </p:nvGrpSpPr>
+      <p:grpSpPr>
+        <a:xfrm>
+          <a:off x="0" y="0"/>
+          <a:ext cx="0" cy="0"/>
+          <a:chOff x="0" y="0"/>
+          <a:chExt cx="0" cy="0"/>
+        </a:xfrm>
+      </p:grpSpPr>
+      <p:sp>
+        <p:nvSpPr>
+          <p:cNvPr id="2" name="Title 1"/>
+          <p:cNvSpPr>
+            <a:spLocks noGrp="1"/>
+          </p:cNvSpPr>
+          <p:nvPr>
+            <p:ph type="title"/>
+          </p:nvPr>
+        </p:nvSpPr>
+        <p:spPr/>
+        <p:txBody>
+          <a:bodyPr/>
+          <a:lstStyle/>
+          <a:p>
+            <a:r>
+              <a:rPr lang="ru-RU" dirty="0" smtClean="0"/>
+              <a:t>Ссылки</a:t>
+            </a:r>
+            <a:endParaRPr lang="en-US" dirty="0"/>
+          </a:p>
+        </p:txBody>
+      </p:sp>
+      <p:sp>
+        <p:nvSpPr>
+          <p:cNvPr id="3" name="Content Placeholder 2"/>
+          <p:cNvSpPr>
+            <a:spLocks noGrp="1"/>
+          </p:cNvSpPr>
+          <p:nvPr>
+            <p:ph idx="1"/>
+          </p:nvPr>
+        </p:nvSpPr>
+        <p:spPr/>
+        <p:txBody>
+          <a:bodyPr/>
+          <a:lstStyle/>
+          <a:p>
+            <a:r>
+              <a:rPr lang="en-US" dirty="0">
+                <a:hlinkClick r:id="rId2"/>
+              </a:rPr>
+              <a:t>Microsoft Application Architecture Guide, 2nd </a:t>
+            </a:r>
+            <a:r>
+              <a:rPr lang="en-US" dirty="0" smtClean="0">
+                <a:hlinkClick r:id="rId2"/>
+              </a:rPr>
+              <a:t>Edition</a:t>
+            </a:r>
+            <a:endParaRPr lang="ru-RU" dirty="0" smtClean="0"/>
+          </a:p>
+          <a:p>
+            <a:endParaRPr lang="en-US" dirty="0"/>
+          </a:p>
+        </p:txBody>
+      </p:sp>
+    </p:spTree>
+    <p:extLst>
+      <p:ext uri="{BB962C8B-B14F-4D97-AF65-F5344CB8AC3E}">
+        <p14:creationId xmlns:p14="http://schemas.microsoft.com/office/powerpoint/2010/main" val="1590135107"/>
+      </p:ext>
+    </p:extLst>
+  </p:cSld>
+  <p:clrMapOvr>
+    <a:masterClrMapping/>
+  </p:clrMapOvr>
+</p:sld>
+</file>
+
 <file path=ppt/slides/slide3.xml><?xml version="1.0" encoding="utf-8"?>
 <p:sld xmlns:a="http://schemas.openxmlformats.org/drawingml/2006/main" xmlns:r="http://schemas.openxmlformats.org/officeDocument/2006/relationships" xmlns:p="http://schemas.openxmlformats.org/presentationml/2006/main">
   <p:cSld>
@@ -4470,71 +4625,111 @@
       </p:grpSpPr>
       <p:sp>
         <p:nvSpPr>
-          <p:cNvPr id="2" name="Title 1"/>
-          <p:cNvSpPr>
-            <a:spLocks noGrp="1"/>
-          </p:cNvSpPr>
-          <p:nvPr>
-            <p:ph type="title"/>
-          </p:nvPr>
-        </p:nvSpPr>
-        <p:spPr/>
-        <p:txBody>
-          <a:bodyPr/>
+          <p:cNvPr id="3" name="Rectangle 2"/>
+          <p:cNvSpPr/>
+          <p:nvPr/>
+        </p:nvSpPr>
+        <p:spPr>
+          <a:xfrm>
+            <a:off x="251520" y="2397949"/>
+            <a:ext cx="8640960" cy="2062103"/>
+          </a:xfrm>
+          <a:prstGeom prst="rect">
+            <a:avLst/>
+          </a:prstGeom>
+        </p:spPr>
+        <p:txBody>
+          <a:bodyPr wrap="square">
+            <a:spAutoFit/>
+          </a:bodyPr>
           <a:lstStyle/>
           <a:p>
-            <a:r>
-              <a:rPr lang="ru-RU" dirty="0" smtClean="0"/>
-              <a:t>Ссылки</a:t>
-            </a:r>
-            <a:endParaRPr lang="en-US" dirty="0"/>
-          </a:p>
-        </p:txBody>
-      </p:sp>
-      <p:sp>
-        <p:nvSpPr>
-          <p:cNvPr id="3" name="Content Placeholder 2"/>
-          <p:cNvSpPr>
-            <a:spLocks noGrp="1"/>
-          </p:cNvSpPr>
-          <p:nvPr>
-            <p:ph idx="1"/>
-          </p:nvPr>
-        </p:nvSpPr>
-        <p:spPr/>
-        <p:txBody>
-          <a:bodyPr/>
-          <a:lstStyle/>
-          <a:p>
-            <a:r>
-              <a:rPr lang="en-US" dirty="0">
+            <a:pPr lvl="0" algn="ctr"/>
+            <a:r>
+              <a:rPr lang="en-US" sz="3200" dirty="0">
+                <a:solidFill>
+                  <a:schemeClr val="bg1"/>
+                </a:solidFill>
                 <a:hlinkClick r:id="rId2"/>
               </a:rPr>
-              <a:t>Microsoft Application Architecture Guide, 2nd </a:t>
-            </a:r>
-            <a:r>
-              <a:rPr lang="en-US" dirty="0" smtClean="0">
+              <a:t>https://</a:t>
+            </a:r>
+            <a:r>
+              <a:rPr lang="en-US" sz="3200" dirty="0" smtClean="0">
+                <a:solidFill>
+                  <a:schemeClr val="bg1"/>
+                </a:solidFill>
                 <a:hlinkClick r:id="rId2"/>
               </a:rPr>
-              <a:t>Edition</a:t>
-            </a:r>
-            <a:endParaRPr lang="ru-RU" dirty="0" smtClean="0"/>
-          </a:p>
-          <a:p>
-            <a:endParaRPr lang="en-US" dirty="0"/>
+              <a:t>github.com/bazile/Training</a:t>
+            </a:r>
+            <a:endParaRPr lang="en-US" sz="3200" dirty="0" smtClean="0">
+              <a:solidFill>
+                <a:schemeClr val="bg1"/>
+              </a:solidFill>
+            </a:endParaRPr>
+          </a:p>
+          <a:p>
+            <a:pPr lvl="0" algn="ctr"/>
+            <a:endParaRPr lang="en-US" sz="3200" dirty="0">
+              <a:solidFill>
+                <a:schemeClr val="bg1"/>
+              </a:solidFill>
+            </a:endParaRPr>
+          </a:p>
+          <a:p>
+            <a:pPr lvl="0" algn="ctr"/>
+            <a:endParaRPr lang="en-US" sz="3200" dirty="0" smtClean="0">
+              <a:solidFill>
+                <a:schemeClr val="bg1"/>
+              </a:solidFill>
+            </a:endParaRPr>
+          </a:p>
+          <a:p>
+            <a:pPr lvl="0" algn="ctr"/>
+            <a:r>
+              <a:rPr lang="en-US" sz="3200" dirty="0">
+                <a:solidFill>
+                  <a:schemeClr val="bg1"/>
+                </a:solidFill>
+                <a:hlinkClick r:id="rId3"/>
+              </a:rPr>
+              <a:t>http://belhard.nullptr.ru</a:t>
+            </a:r>
+            <a:r>
+              <a:rPr lang="en-US" sz="3200" dirty="0" smtClean="0">
+                <a:solidFill>
+                  <a:schemeClr val="bg1"/>
+                </a:solidFill>
+                <a:hlinkClick r:id="rId3"/>
+              </a:rPr>
+              <a:t>/</a:t>
+            </a:r>
+            <a:endParaRPr lang="en-US" sz="3200" dirty="0" smtClean="0">
+              <a:solidFill>
+                <a:schemeClr val="bg1"/>
+              </a:solidFill>
+            </a:endParaRPr>
           </a:p>
         </p:txBody>
       </p:sp>
     </p:spTree>
     <p:extLst>
       <p:ext uri="{BB962C8B-B14F-4D97-AF65-F5344CB8AC3E}">
-        <p14:creationId xmlns:p14="http://schemas.microsoft.com/office/powerpoint/2010/main" val="1590135107"/>
+        <p14:creationId xmlns:p14="http://schemas.microsoft.com/office/powerpoint/2010/main" val="1259076132"/>
       </p:ext>
     </p:extLst>
   </p:cSld>
   <p:clrMapOvr>
     <a:masterClrMapping/>
   </p:clrMapOvr>
+  <p:timing>
+    <p:tnLst>
+      <p:par>
+        <p:cTn id="1" dur="indefinite" restart="never" nodeType="tmRoot"/>
+      </p:par>
+    </p:tnLst>
+  </p:timing>
 </p:sld>
 </file>
 
@@ -4557,133 +4752,6 @@
       </p:grpSpPr>
       <p:sp>
         <p:nvSpPr>
-          <p:cNvPr id="3" name="Rectangle 2"/>
-          <p:cNvSpPr/>
-          <p:nvPr/>
-        </p:nvSpPr>
-        <p:spPr>
-          <a:xfrm>
-            <a:off x="251520" y="2397949"/>
-            <a:ext cx="8640960" cy="2062103"/>
-          </a:xfrm>
-          <a:prstGeom prst="rect">
-            <a:avLst/>
-          </a:prstGeom>
-        </p:spPr>
-        <p:txBody>
-          <a:bodyPr wrap="square">
-            <a:spAutoFit/>
-          </a:bodyPr>
-          <a:lstStyle/>
-          <a:p>
-            <a:pPr lvl="0" algn="ctr"/>
-            <a:r>
-              <a:rPr lang="en-US" sz="3200" dirty="0">
-                <a:solidFill>
-                  <a:schemeClr val="bg1"/>
-                </a:solidFill>
-                <a:hlinkClick r:id="rId2"/>
-              </a:rPr>
-              <a:t>https://</a:t>
-            </a:r>
-            <a:r>
-              <a:rPr lang="en-US" sz="3200" dirty="0" smtClean="0">
-                <a:solidFill>
-                  <a:schemeClr val="bg1"/>
-                </a:solidFill>
-                <a:hlinkClick r:id="rId2"/>
-              </a:rPr>
-              <a:t>github.com/bazile/Training</a:t>
-            </a:r>
-            <a:endParaRPr lang="en-US" sz="3200" dirty="0" smtClean="0">
-              <a:solidFill>
-                <a:schemeClr val="bg1"/>
-              </a:solidFill>
-            </a:endParaRPr>
-          </a:p>
-          <a:p>
-            <a:pPr lvl="0" algn="ctr"/>
-            <a:endParaRPr lang="en-US" sz="3200" dirty="0">
-              <a:solidFill>
-                <a:schemeClr val="bg1"/>
-              </a:solidFill>
-            </a:endParaRPr>
-          </a:p>
-          <a:p>
-            <a:pPr lvl="0" algn="ctr"/>
-            <a:endParaRPr lang="en-US" sz="3200" dirty="0" smtClean="0">
-              <a:solidFill>
-                <a:schemeClr val="bg1"/>
-              </a:solidFill>
-            </a:endParaRPr>
-          </a:p>
-          <a:p>
-            <a:pPr lvl="0" algn="ctr"/>
-            <a:r>
-              <a:rPr lang="en-US" sz="3200" dirty="0">
-                <a:solidFill>
-                  <a:schemeClr val="bg1"/>
-                </a:solidFill>
-                <a:hlinkClick r:id="rId3"/>
-              </a:rPr>
-              <a:t>http://belhard.nullptr.ru</a:t>
-            </a:r>
-            <a:r>
-              <a:rPr lang="en-US" sz="3200" dirty="0" smtClean="0">
-                <a:solidFill>
-                  <a:schemeClr val="bg1"/>
-                </a:solidFill>
-                <a:hlinkClick r:id="rId3"/>
-              </a:rPr>
-              <a:t>/</a:t>
-            </a:r>
-            <a:endParaRPr lang="en-US" sz="3200" dirty="0" smtClean="0">
-              <a:solidFill>
-                <a:schemeClr val="bg1"/>
-              </a:solidFill>
-            </a:endParaRPr>
-          </a:p>
-        </p:txBody>
-      </p:sp>
-    </p:spTree>
-    <p:extLst>
-      <p:ext uri="{BB962C8B-B14F-4D97-AF65-F5344CB8AC3E}">
-        <p14:creationId xmlns:p14="http://schemas.microsoft.com/office/powerpoint/2010/main" val="1259076132"/>
-      </p:ext>
-    </p:extLst>
-  </p:cSld>
-  <p:clrMapOvr>
-    <a:masterClrMapping/>
-  </p:clrMapOvr>
-  <p:timing>
-    <p:tnLst>
-      <p:par>
-        <p:cTn id="1" dur="indefinite" restart="never" nodeType="tmRoot"/>
-      </p:par>
-    </p:tnLst>
-  </p:timing>
-</p:sld>
-</file>
-
-<file path=ppt/slides/slide5.xml><?xml version="1.0" encoding="utf-8"?>
-<p:sld xmlns:a="http://schemas.openxmlformats.org/drawingml/2006/main" xmlns:r="http://schemas.openxmlformats.org/officeDocument/2006/relationships" xmlns:p="http://schemas.openxmlformats.org/presentationml/2006/main">
-  <p:cSld>
-    <p:spTree>
-      <p:nvGrpSpPr>
-        <p:cNvPr id="1" name=""/>
-        <p:cNvGrpSpPr/>
-        <p:nvPr/>
-      </p:nvGrpSpPr>
-      <p:grpSpPr>
-        <a:xfrm>
-          <a:off x="0" y="0"/>
-          <a:ext cx="0" cy="0"/>
-          <a:chOff x="0" y="0"/>
-          <a:chExt cx="0" cy="0"/>
-        </a:xfrm>
-      </p:grpSpPr>
-      <p:sp>
-        <p:nvSpPr>
           <p:cNvPr id="2" name="Title 1"/>
           <p:cNvSpPr>
             <a:spLocks noGrp="1"/>
@@ -4746,7 +4814,7 @@
 </p:sld>
 </file>
 
-<file path=ppt/slides/slide6.xml><?xml version="1.0" encoding="utf-8"?>
+<file path=ppt/slides/slide5.xml><?xml version="1.0" encoding="utf-8"?>
 <p:sld xmlns:a="http://schemas.openxmlformats.org/drawingml/2006/main" xmlns:r="http://schemas.openxmlformats.org/officeDocument/2006/relationships" xmlns:p="http://schemas.openxmlformats.org/presentationml/2006/main">
   <p:cSld>
     <p:bg>
@@ -4825,7 +4893,7 @@
 </p:sld>
 </file>
 
-<file path=ppt/slides/slide7.xml><?xml version="1.0" encoding="utf-8"?>
+<file path=ppt/slides/slide6.xml><?xml version="1.0" encoding="utf-8"?>
 <p:sld xmlns:a="http://schemas.openxmlformats.org/drawingml/2006/main" xmlns:r="http://schemas.openxmlformats.org/officeDocument/2006/relationships" xmlns:p="http://schemas.openxmlformats.org/presentationml/2006/main">
   <p:cSld>
     <p:bg>
@@ -4940,7 +5008,7 @@
 </p:sld>
 </file>
 
-<file path=ppt/slides/slide8.xml><?xml version="1.0" encoding="utf-8"?>
+<file path=ppt/slides/slide7.xml><?xml version="1.0" encoding="utf-8"?>
 <p:sld xmlns:a="http://schemas.openxmlformats.org/drawingml/2006/main" xmlns:r="http://schemas.openxmlformats.org/officeDocument/2006/relationships" xmlns:p="http://schemas.openxmlformats.org/presentationml/2006/main">
   <p:cSld>
     <p:spTree>
@@ -5032,7 +5100,7 @@
 </p:sld>
 </file>
 
-<file path=ppt/slides/slide9.xml><?xml version="1.0" encoding="utf-8"?>
+<file path=ppt/slides/slide8.xml><?xml version="1.0" encoding="utf-8"?>
 <p:sld xmlns:a="http://schemas.openxmlformats.org/drawingml/2006/main" xmlns:r="http://schemas.openxmlformats.org/officeDocument/2006/relationships" xmlns:p="http://schemas.openxmlformats.org/presentationml/2006/main">
   <p:cSld>
     <p:bg>
@@ -5138,6 +5206,100 @@
     <p:extLst>
       <p:ext uri="{BB962C8B-B14F-4D97-AF65-F5344CB8AC3E}">
         <p14:creationId xmlns:p14="http://schemas.microsoft.com/office/powerpoint/2010/main" val="3185773920"/>
+      </p:ext>
+    </p:extLst>
+  </p:cSld>
+  <p:clrMapOvr>
+    <a:masterClrMapping/>
+  </p:clrMapOvr>
+</p:sld>
+</file>
+
+<file path=ppt/slides/slide9.xml><?xml version="1.0" encoding="utf-8"?>
+<p:sld xmlns:a="http://schemas.openxmlformats.org/drawingml/2006/main" xmlns:r="http://schemas.openxmlformats.org/officeDocument/2006/relationships" xmlns:p="http://schemas.openxmlformats.org/presentationml/2006/main">
+  <p:cSld>
+    <p:spTree>
+      <p:nvGrpSpPr>
+        <p:cNvPr id="1" name=""/>
+        <p:cNvGrpSpPr/>
+        <p:nvPr/>
+      </p:nvGrpSpPr>
+      <p:grpSpPr>
+        <a:xfrm>
+          <a:off x="0" y="0"/>
+          <a:ext cx="0" cy="0"/>
+          <a:chOff x="0" y="0"/>
+          <a:chExt cx="0" cy="0"/>
+        </a:xfrm>
+      </p:grpSpPr>
+      <p:sp>
+        <p:nvSpPr>
+          <p:cNvPr id="2" name="Title 1"/>
+          <p:cNvSpPr>
+            <a:spLocks noGrp="1"/>
+          </p:cNvSpPr>
+          <p:nvPr>
+            <p:ph type="title"/>
+          </p:nvPr>
+        </p:nvSpPr>
+        <p:spPr/>
+        <p:txBody>
+          <a:bodyPr>
+            <a:normAutofit fontScale="90000"/>
+          </a:bodyPr>
+          <a:lstStyle/>
+          <a:p>
+            <a:pPr marL="742950" indent="-742950">
+              <a:buFont typeface="+mj-lt"/>
+              <a:buAutoNum type="arabicPeriod" startAt="2"/>
+            </a:pPr>
+            <a:r>
+              <a:rPr lang="ru-RU" dirty="0" smtClean="0"/>
+              <a:t>Основополагающие принципы</a:t>
+            </a:r>
+            <a:endParaRPr lang="en-US" dirty="0"/>
+          </a:p>
+        </p:txBody>
+      </p:sp>
+      <p:sp>
+        <p:nvSpPr>
+          <p:cNvPr id="3" name="Content Placeholder 2"/>
+          <p:cNvSpPr>
+            <a:spLocks noGrp="1"/>
+          </p:cNvSpPr>
+          <p:nvPr>
+            <p:ph idx="1"/>
+          </p:nvPr>
+        </p:nvSpPr>
+        <p:spPr/>
+        <p:txBody>
+          <a:bodyPr>
+            <a:normAutofit/>
+          </a:bodyPr>
+          <a:lstStyle/>
+          <a:p>
+            <a:r>
+              <a:rPr lang="en-US" b="1" dirty="0" smtClean="0"/>
+              <a:t>Single </a:t>
+            </a:r>
+            <a:r>
+              <a:rPr lang="en-US" b="1" dirty="0"/>
+              <a:t>Responsibility principle</a:t>
+            </a:r>
+            <a:r>
+              <a:rPr lang="en-US" dirty="0"/>
+              <a:t>. Each component or module should be responsible for only a specific feature or functionality, or aggregation of cohesive functionality.</a:t>
+            </a:r>
+          </a:p>
+          <a:p>
+            <a:endParaRPr lang="en-US" dirty="0"/>
+          </a:p>
+        </p:txBody>
+      </p:sp>
+    </p:spTree>
+    <p:extLst>
+      <p:ext uri="{BB962C8B-B14F-4D97-AF65-F5344CB8AC3E}">
+        <p14:creationId xmlns:p14="http://schemas.microsoft.com/office/powerpoint/2010/main" val="546871388"/>
       </p:ext>
     </p:extLst>
   </p:cSld>

</xml_diff>

<commit_message>
Added link to book about TDD
</commit_message>
<xml_diff>
--- a/Presentation/lesson-14.pptx
+++ b/Presentation/lesson-14.pptx
@@ -210,7 +210,7 @@
           <a:p>
             <a:fld id="{B24A7054-7FFB-49F4-A126-5DF6E687FF53}" type="datetimeFigureOut">
               <a:rPr lang="ru-RU" smtClean="0"/>
-              <a:t>06.11.2012</a:t>
+              <a:t>22.12.2012</a:t>
             </a:fld>
             <a:endParaRPr lang="ru-RU"/>
           </a:p>
@@ -1273,7 +1273,7 @@
           <a:p>
             <a:fld id="{8E6E6A2A-E9D3-4A0D-B04A-ABDD367A1E08}" type="datetimeFigureOut">
               <a:rPr lang="ru-RU" smtClean="0"/>
-              <a:t>06.11.2012</a:t>
+              <a:t>22.12.2012</a:t>
             </a:fld>
             <a:endParaRPr lang="ru-RU"/>
           </a:p>
@@ -2721,7 +2721,7 @@
           <a:p>
             <a:fld id="{AC3D3127-B7C4-45E3-9797-C527EC9FDD78}" type="datetimeFigureOut">
               <a:rPr lang="ru-RU" smtClean="0"/>
-              <a:t>06.11.2012</a:t>
+              <a:t>22.12.2012</a:t>
             </a:fld>
             <a:endParaRPr lang="ru-RU"/>
           </a:p>
@@ -4274,13 +4274,42 @@
             </a:r>
             <a:r>
               <a:rPr lang="ru-RU" dirty="0" smtClean="0"/>
-              <a:t>управляемое тестами)</a:t>
-            </a:r>
+              <a:t>управляемое тестами</a:t>
+            </a:r>
+            <a:r>
+              <a:rPr lang="ru-RU" dirty="0" smtClean="0"/>
+              <a:t>)</a:t>
+            </a:r>
+            <a:endParaRPr lang="en-US" dirty="0" smtClean="0"/>
+          </a:p>
+          <a:p>
+            <a:pPr lvl="1"/>
+            <a:r>
+              <a:rPr lang="ru-RU" dirty="0" smtClean="0"/>
+              <a:t>Книга: </a:t>
+            </a:r>
+            <a:r>
+              <a:rPr lang="en-US" dirty="0">
+                <a:hlinkClick r:id="rId2"/>
+              </a:rPr>
+              <a:t>The Art of Unit Testing: With Examples in </a:t>
+            </a:r>
+            <a:r>
+              <a:rPr lang="en-US" dirty="0" err="1">
+                <a:hlinkClick r:id="rId2"/>
+              </a:rPr>
+              <a:t>.Net</a:t>
+            </a:r>
+            <a:endParaRPr lang="ru-RU" dirty="0" smtClean="0"/>
           </a:p>
           <a:p>
             <a:r>
               <a:rPr lang="en-US" dirty="0" smtClean="0"/>
-              <a:t>Continuous Integration (CI)</a:t>
+              <a:t>Continuous </a:t>
+            </a:r>
+            <a:r>
+              <a:rPr lang="en-US" dirty="0" smtClean="0"/>
+              <a:t>Integration (CI)</a:t>
             </a:r>
             <a:endParaRPr lang="en-US" dirty="0"/>
           </a:p>

</xml_diff>